<commit_message>
Added Algorithm complexity presentation
</commit_message>
<xml_diff>
--- a/09.alorithms-and-data-structures.pptx
+++ b/09.alorithms-and-data-structures.pptx
@@ -10,6 +10,24 @@
     <p:sldId id="258" r:id="rId4"/>
     <p:sldId id="259" r:id="rId5"/>
     <p:sldId id="260" r:id="rId6"/>
+    <p:sldId id="261" r:id="rId7"/>
+    <p:sldId id="262" r:id="rId8"/>
+    <p:sldId id="263" r:id="rId9"/>
+    <p:sldId id="264" r:id="rId10"/>
+    <p:sldId id="265" r:id="rId11"/>
+    <p:sldId id="266" r:id="rId12"/>
+    <p:sldId id="267" r:id="rId13"/>
+    <p:sldId id="268" r:id="rId14"/>
+    <p:sldId id="269" r:id="rId15"/>
+    <p:sldId id="270" r:id="rId16"/>
+    <p:sldId id="271" r:id="rId17"/>
+    <p:sldId id="272" r:id="rId18"/>
+    <p:sldId id="273" r:id="rId19"/>
+    <p:sldId id="274" r:id="rId20"/>
+    <p:sldId id="275" r:id="rId21"/>
+    <p:sldId id="276" r:id="rId22"/>
+    <p:sldId id="278" r:id="rId23"/>
+    <p:sldId id="277" r:id="rId24"/>
   </p:sldIdLst>
   <p:sldSz cx="12192000" cy="6858000"/>
   <p:notesSz cx="6858000" cy="9144000"/>
@@ -166,7 +184,7 @@
           <a:noFill/>
           <a:extLst>
             <a:ext uri="{909E8E84-426E-40dd-AFC4-6F175D3DCCD1}">
-              <a14:hiddenFill xmlns="" xmlns:a14="http://schemas.microsoft.com/office/drawing/2010/main">
+              <a14:hiddenFill xmlns:a14="http://schemas.microsoft.com/office/drawing/2010/main" xmlns="">
                 <a:solidFill>
                   <a:srgbClr val="FFFFFF"/>
                 </a:solidFill>
@@ -226,7 +244,7 @@
             </a:ln>
             <a:extLst>
               <a:ext uri="{91240B29-F687-4f45-9708-019B960494DF}">
-                <a14:hiddenLine xmlns="" xmlns:a14="http://schemas.microsoft.com/office/drawing/2010/main" w="9525">
+                <a14:hiddenLine xmlns:a14="http://schemas.microsoft.com/office/drawing/2010/main" xmlns="" w="9525">
                   <a:solidFill>
                     <a:srgbClr val="000000"/>
                   </a:solidFill>
@@ -316,7 +334,7 @@
             </a:ln>
             <a:extLst>
               <a:ext uri="{91240B29-F687-4f45-9708-019B960494DF}">
-                <a14:hiddenLine xmlns="" xmlns:a14="http://schemas.microsoft.com/office/drawing/2010/main" w="9525">
+                <a14:hiddenLine xmlns:a14="http://schemas.microsoft.com/office/drawing/2010/main" xmlns="" w="9525">
                   <a:solidFill>
                     <a:srgbClr val="000000"/>
                   </a:solidFill>
@@ -406,7 +424,7 @@
             </a:ln>
             <a:extLst>
               <a:ext uri="{91240B29-F687-4f45-9708-019B960494DF}">
-                <a14:hiddenLine xmlns="" xmlns:a14="http://schemas.microsoft.com/office/drawing/2010/main" w="9525">
+                <a14:hiddenLine xmlns:a14="http://schemas.microsoft.com/office/drawing/2010/main" xmlns="" w="9525">
                   <a:solidFill>
                     <a:srgbClr val="000000"/>
                   </a:solidFill>
@@ -440,7 +458,7 @@
             </a:ln>
             <a:extLst>
               <a:ext uri="{91240B29-F687-4f45-9708-019B960494DF}">
-                <a14:hiddenLine xmlns="" xmlns:a14="http://schemas.microsoft.com/office/drawing/2010/main" w="9525">
+                <a14:hiddenLine xmlns:a14="http://schemas.microsoft.com/office/drawing/2010/main" xmlns="" w="9525">
                   <a:solidFill>
                     <a:srgbClr val="000000"/>
                   </a:solidFill>
@@ -530,7 +548,7 @@
             </a:ln>
             <a:extLst>
               <a:ext uri="{91240B29-F687-4f45-9708-019B960494DF}">
-                <a14:hiddenLine xmlns="" xmlns:a14="http://schemas.microsoft.com/office/drawing/2010/main" w="9525">
+                <a14:hiddenLine xmlns:a14="http://schemas.microsoft.com/office/drawing/2010/main" xmlns="" w="9525">
                   <a:solidFill>
                     <a:srgbClr val="000000"/>
                   </a:solidFill>
@@ -592,7 +610,7 @@
             </a:ln>
             <a:extLst>
               <a:ext uri="{91240B29-F687-4f45-9708-019B960494DF}">
-                <a14:hiddenLine xmlns="" xmlns:a14="http://schemas.microsoft.com/office/drawing/2010/main" w="9525">
+                <a14:hiddenLine xmlns:a14="http://schemas.microsoft.com/office/drawing/2010/main" xmlns="" w="9525">
                   <a:solidFill>
                     <a:srgbClr val="000000"/>
                   </a:solidFill>
@@ -654,7 +672,7 @@
             </a:ln>
             <a:extLst>
               <a:ext uri="{91240B29-F687-4f45-9708-019B960494DF}">
-                <a14:hiddenLine xmlns="" xmlns:a14="http://schemas.microsoft.com/office/drawing/2010/main" w="9525">
+                <a14:hiddenLine xmlns:a14="http://schemas.microsoft.com/office/drawing/2010/main" xmlns="" w="9525">
                   <a:solidFill>
                     <a:srgbClr val="000000"/>
                   </a:solidFill>
@@ -744,7 +762,7 @@
             </a:ln>
             <a:extLst>
               <a:ext uri="{91240B29-F687-4f45-9708-019B960494DF}">
-                <a14:hiddenLine xmlns="" xmlns:a14="http://schemas.microsoft.com/office/drawing/2010/main" w="9525">
+                <a14:hiddenLine xmlns:a14="http://schemas.microsoft.com/office/drawing/2010/main" xmlns="" w="9525">
                   <a:solidFill>
                     <a:srgbClr val="000000"/>
                   </a:solidFill>
@@ -806,7 +824,7 @@
             </a:ln>
             <a:extLst>
               <a:ext uri="{91240B29-F687-4f45-9708-019B960494DF}">
-                <a14:hiddenLine xmlns="" xmlns:a14="http://schemas.microsoft.com/office/drawing/2010/main" w="9525">
+                <a14:hiddenLine xmlns:a14="http://schemas.microsoft.com/office/drawing/2010/main" xmlns="" w="9525">
                   <a:solidFill>
                     <a:srgbClr val="000000"/>
                   </a:solidFill>
@@ -868,7 +886,7 @@
             </a:ln>
             <a:extLst>
               <a:ext uri="{91240B29-F687-4f45-9708-019B960494DF}">
-                <a14:hiddenLine xmlns="" xmlns:a14="http://schemas.microsoft.com/office/drawing/2010/main" w="9525">
+                <a14:hiddenLine xmlns:a14="http://schemas.microsoft.com/office/drawing/2010/main" xmlns="" w="9525">
                   <a:solidFill>
                     <a:srgbClr val="000000"/>
                   </a:solidFill>
@@ -958,7 +976,7 @@
             </a:ln>
             <a:extLst>
               <a:ext uri="{91240B29-F687-4f45-9708-019B960494DF}">
-                <a14:hiddenLine xmlns="" xmlns:a14="http://schemas.microsoft.com/office/drawing/2010/main" w="9525">
+                <a14:hiddenLine xmlns:a14="http://schemas.microsoft.com/office/drawing/2010/main" xmlns="" w="9525">
                   <a:solidFill>
                     <a:srgbClr val="000000"/>
                   </a:solidFill>
@@ -1048,7 +1066,7 @@
             </a:ln>
             <a:extLst>
               <a:ext uri="{91240B29-F687-4f45-9708-019B960494DF}">
-                <a14:hiddenLine xmlns="" xmlns:a14="http://schemas.microsoft.com/office/drawing/2010/main" w="9525">
+                <a14:hiddenLine xmlns:a14="http://schemas.microsoft.com/office/drawing/2010/main" xmlns="" w="9525">
                   <a:solidFill>
                     <a:srgbClr val="000000"/>
                   </a:solidFill>
@@ -1110,7 +1128,7 @@
             </a:ln>
             <a:extLst>
               <a:ext uri="{91240B29-F687-4f45-9708-019B960494DF}">
-                <a14:hiddenLine xmlns="" xmlns:a14="http://schemas.microsoft.com/office/drawing/2010/main" w="9525">
+                <a14:hiddenLine xmlns:a14="http://schemas.microsoft.com/office/drawing/2010/main" xmlns="" w="9525">
                   <a:solidFill>
                     <a:srgbClr val="000000"/>
                   </a:solidFill>
@@ -1220,7 +1238,7 @@
             </a:ln>
             <a:extLst>
               <a:ext uri="{91240B29-F687-4f45-9708-019B960494DF}">
-                <a14:hiddenLine xmlns="" xmlns:a14="http://schemas.microsoft.com/office/drawing/2010/main" w="9525">
+                <a14:hiddenLine xmlns:a14="http://schemas.microsoft.com/office/drawing/2010/main" xmlns="" w="9525">
                   <a:solidFill>
                     <a:srgbClr val="000000"/>
                   </a:solidFill>
@@ -1282,7 +1300,7 @@
             </a:ln>
             <a:extLst>
               <a:ext uri="{91240B29-F687-4f45-9708-019B960494DF}">
-                <a14:hiddenLine xmlns="" xmlns:a14="http://schemas.microsoft.com/office/drawing/2010/main" w="9525">
+                <a14:hiddenLine xmlns:a14="http://schemas.microsoft.com/office/drawing/2010/main" xmlns="" w="9525">
                   <a:solidFill>
                     <a:srgbClr val="000000"/>
                   </a:solidFill>
@@ -1372,7 +1390,7 @@
             </a:ln>
             <a:extLst>
               <a:ext uri="{91240B29-F687-4f45-9708-019B960494DF}">
-                <a14:hiddenLine xmlns="" xmlns:a14="http://schemas.microsoft.com/office/drawing/2010/main" w="9525">
+                <a14:hiddenLine xmlns:a14="http://schemas.microsoft.com/office/drawing/2010/main" xmlns="" w="9525">
                   <a:solidFill>
                     <a:srgbClr val="000000"/>
                   </a:solidFill>
@@ -1462,7 +1480,7 @@
             </a:ln>
             <a:extLst>
               <a:ext uri="{91240B29-F687-4f45-9708-019B960494DF}">
-                <a14:hiddenLine xmlns="" xmlns:a14="http://schemas.microsoft.com/office/drawing/2010/main" w="9525">
+                <a14:hiddenLine xmlns:a14="http://schemas.microsoft.com/office/drawing/2010/main" xmlns="" w="9525">
                   <a:solidFill>
                     <a:srgbClr val="000000"/>
                   </a:solidFill>
@@ -1524,7 +1542,7 @@
             </a:ln>
             <a:extLst>
               <a:ext uri="{91240B29-F687-4f45-9708-019B960494DF}">
-                <a14:hiddenLine xmlns="" xmlns:a14="http://schemas.microsoft.com/office/drawing/2010/main" w="9525">
+                <a14:hiddenLine xmlns:a14="http://schemas.microsoft.com/office/drawing/2010/main" xmlns="" w="9525">
                   <a:solidFill>
                     <a:srgbClr val="000000"/>
                   </a:solidFill>
@@ -1614,7 +1632,7 @@
             </a:ln>
             <a:extLst>
               <a:ext uri="{91240B29-F687-4f45-9708-019B960494DF}">
-                <a14:hiddenLine xmlns="" xmlns:a14="http://schemas.microsoft.com/office/drawing/2010/main" w="9525">
+                <a14:hiddenLine xmlns:a14="http://schemas.microsoft.com/office/drawing/2010/main" xmlns="" w="9525">
                   <a:solidFill>
                     <a:srgbClr val="000000"/>
                   </a:solidFill>
@@ -1704,7 +1722,7 @@
             </a:ln>
             <a:extLst>
               <a:ext uri="{91240B29-F687-4f45-9708-019B960494DF}">
-                <a14:hiddenLine xmlns="" xmlns:a14="http://schemas.microsoft.com/office/drawing/2010/main" w="9525">
+                <a14:hiddenLine xmlns:a14="http://schemas.microsoft.com/office/drawing/2010/main" xmlns="" w="9525">
                   <a:solidFill>
                     <a:srgbClr val="000000"/>
                   </a:solidFill>
@@ -1760,7 +1778,7 @@
             </a:ln>
             <a:extLst>
               <a:ext uri="{91240B29-F687-4f45-9708-019B960494DF}">
-                <a14:hiddenLine xmlns="" xmlns:a14="http://schemas.microsoft.com/office/drawing/2010/main" w="9525">
+                <a14:hiddenLine xmlns:a14="http://schemas.microsoft.com/office/drawing/2010/main" xmlns="" w="9525">
                   <a:solidFill>
                     <a:srgbClr val="000000"/>
                   </a:solidFill>
@@ -1850,7 +1868,7 @@
             </a:ln>
             <a:extLst>
               <a:ext uri="{91240B29-F687-4f45-9708-019B960494DF}">
-                <a14:hiddenLine xmlns="" xmlns:a14="http://schemas.microsoft.com/office/drawing/2010/main" w="9525">
+                <a14:hiddenLine xmlns:a14="http://schemas.microsoft.com/office/drawing/2010/main" xmlns="" w="9525">
                   <a:solidFill>
                     <a:srgbClr val="000000"/>
                   </a:solidFill>
@@ -1906,7 +1924,7 @@
             </a:ln>
             <a:extLst>
               <a:ext uri="{91240B29-F687-4f45-9708-019B960494DF}">
-                <a14:hiddenLine xmlns="" xmlns:a14="http://schemas.microsoft.com/office/drawing/2010/main" w="9525">
+                <a14:hiddenLine xmlns:a14="http://schemas.microsoft.com/office/drawing/2010/main" xmlns="" w="9525">
                   <a:solidFill>
                     <a:srgbClr val="000000"/>
                   </a:solidFill>
@@ -1996,7 +2014,7 @@
             </a:ln>
             <a:extLst>
               <a:ext uri="{91240B29-F687-4f45-9708-019B960494DF}">
-                <a14:hiddenLine xmlns="" xmlns:a14="http://schemas.microsoft.com/office/drawing/2010/main" w="9525">
+                <a14:hiddenLine xmlns:a14="http://schemas.microsoft.com/office/drawing/2010/main" xmlns="" w="9525">
                   <a:solidFill>
                     <a:srgbClr val="000000"/>
                   </a:solidFill>
@@ -2064,7 +2082,7 @@
             </a:ln>
             <a:extLst>
               <a:ext uri="{91240B29-F687-4f45-9708-019B960494DF}">
-                <a14:hiddenLine xmlns="" xmlns:a14="http://schemas.microsoft.com/office/drawing/2010/main" w="9525">
+                <a14:hiddenLine xmlns:a14="http://schemas.microsoft.com/office/drawing/2010/main" xmlns="" w="9525">
                   <a:solidFill>
                     <a:srgbClr val="000000"/>
                   </a:solidFill>
@@ -2154,7 +2172,7 @@
             </a:ln>
             <a:extLst>
               <a:ext uri="{91240B29-F687-4f45-9708-019B960494DF}">
-                <a14:hiddenLine xmlns="" xmlns:a14="http://schemas.microsoft.com/office/drawing/2010/main" w="9525">
+                <a14:hiddenLine xmlns:a14="http://schemas.microsoft.com/office/drawing/2010/main" xmlns="" w="9525">
                   <a:solidFill>
                     <a:srgbClr val="000000"/>
                   </a:solidFill>
@@ -2222,7 +2240,7 @@
             </a:ln>
             <a:extLst>
               <a:ext uri="{91240B29-F687-4f45-9708-019B960494DF}">
-                <a14:hiddenLine xmlns="" xmlns:a14="http://schemas.microsoft.com/office/drawing/2010/main" w="9525">
+                <a14:hiddenLine xmlns:a14="http://schemas.microsoft.com/office/drawing/2010/main" xmlns="" w="9525">
                   <a:solidFill>
                     <a:srgbClr val="000000"/>
                   </a:solidFill>
@@ -2312,7 +2330,7 @@
             </a:ln>
             <a:extLst>
               <a:ext uri="{91240B29-F687-4f45-9708-019B960494DF}">
-                <a14:hiddenLine xmlns="" xmlns:a14="http://schemas.microsoft.com/office/drawing/2010/main" w="9525">
+                <a14:hiddenLine xmlns:a14="http://schemas.microsoft.com/office/drawing/2010/main" xmlns="" w="9525">
                   <a:solidFill>
                     <a:srgbClr val="000000"/>
                   </a:solidFill>
@@ -2346,7 +2364,7 @@
             </a:ln>
             <a:extLst>
               <a:ext uri="{91240B29-F687-4f45-9708-019B960494DF}">
-                <a14:hiddenLine xmlns="" xmlns:a14="http://schemas.microsoft.com/office/drawing/2010/main" w="9525">
+                <a14:hiddenLine xmlns:a14="http://schemas.microsoft.com/office/drawing/2010/main" xmlns="" w="9525">
                   <a:solidFill>
                     <a:srgbClr val="000000"/>
                   </a:solidFill>
@@ -2436,7 +2454,7 @@
             </a:ln>
             <a:extLst>
               <a:ext uri="{91240B29-F687-4f45-9708-019B960494DF}">
-                <a14:hiddenLine xmlns="" xmlns:a14="http://schemas.microsoft.com/office/drawing/2010/main" w="9525">
+                <a14:hiddenLine xmlns:a14="http://schemas.microsoft.com/office/drawing/2010/main" xmlns="" w="9525">
                   <a:solidFill>
                     <a:srgbClr val="000000"/>
                   </a:solidFill>
@@ -2498,7 +2516,7 @@
             </a:ln>
             <a:extLst>
               <a:ext uri="{91240B29-F687-4f45-9708-019B960494DF}">
-                <a14:hiddenLine xmlns="" xmlns:a14="http://schemas.microsoft.com/office/drawing/2010/main" w="9525">
+                <a14:hiddenLine xmlns:a14="http://schemas.microsoft.com/office/drawing/2010/main" xmlns="" w="9525">
                   <a:solidFill>
                     <a:srgbClr val="000000"/>
                   </a:solidFill>
@@ -2560,7 +2578,7 @@
             </a:ln>
             <a:extLst>
               <a:ext uri="{91240B29-F687-4f45-9708-019B960494DF}">
-                <a14:hiddenLine xmlns="" xmlns:a14="http://schemas.microsoft.com/office/drawing/2010/main" w="9525">
+                <a14:hiddenLine xmlns:a14="http://schemas.microsoft.com/office/drawing/2010/main" xmlns="" w="9525">
                   <a:solidFill>
                     <a:srgbClr val="000000"/>
                   </a:solidFill>
@@ -2650,7 +2668,7 @@
             </a:ln>
             <a:extLst>
               <a:ext uri="{91240B29-F687-4f45-9708-019B960494DF}">
-                <a14:hiddenLine xmlns="" xmlns:a14="http://schemas.microsoft.com/office/drawing/2010/main" w="9525">
+                <a14:hiddenLine xmlns:a14="http://schemas.microsoft.com/office/drawing/2010/main" xmlns="" w="9525">
                   <a:solidFill>
                     <a:srgbClr val="000000"/>
                   </a:solidFill>
@@ -2718,7 +2736,7 @@
             </a:ln>
             <a:extLst>
               <a:ext uri="{91240B29-F687-4f45-9708-019B960494DF}">
-                <a14:hiddenLine xmlns="" xmlns:a14="http://schemas.microsoft.com/office/drawing/2010/main" w="9525">
+                <a14:hiddenLine xmlns:a14="http://schemas.microsoft.com/office/drawing/2010/main" xmlns="" w="9525">
                   <a:solidFill>
                     <a:srgbClr val="000000"/>
                   </a:solidFill>
@@ -2780,7 +2798,7 @@
             </a:ln>
             <a:extLst>
               <a:ext uri="{91240B29-F687-4f45-9708-019B960494DF}">
-                <a14:hiddenLine xmlns="" xmlns:a14="http://schemas.microsoft.com/office/drawing/2010/main" w="9525">
+                <a14:hiddenLine xmlns:a14="http://schemas.microsoft.com/office/drawing/2010/main" xmlns="" w="9525">
                   <a:solidFill>
                     <a:srgbClr val="000000"/>
                   </a:solidFill>
@@ -2870,7 +2888,7 @@
             </a:ln>
             <a:extLst>
               <a:ext uri="{91240B29-F687-4f45-9708-019B960494DF}">
-                <a14:hiddenLine xmlns="" xmlns:a14="http://schemas.microsoft.com/office/drawing/2010/main" w="9525">
+                <a14:hiddenLine xmlns:a14="http://schemas.microsoft.com/office/drawing/2010/main" xmlns="" w="9525">
                   <a:solidFill>
                     <a:srgbClr val="000000"/>
                   </a:solidFill>
@@ -2932,7 +2950,7 @@
             </a:ln>
             <a:extLst>
               <a:ext uri="{91240B29-F687-4f45-9708-019B960494DF}">
-                <a14:hiddenLine xmlns="" xmlns:a14="http://schemas.microsoft.com/office/drawing/2010/main" w="9525">
+                <a14:hiddenLine xmlns:a14="http://schemas.microsoft.com/office/drawing/2010/main" xmlns="" w="9525">
                   <a:solidFill>
                     <a:srgbClr val="000000"/>
                   </a:solidFill>
@@ -3022,7 +3040,7 @@
             </a:ln>
             <a:extLst>
               <a:ext uri="{91240B29-F687-4f45-9708-019B960494DF}">
-                <a14:hiddenLine xmlns="" xmlns:a14="http://schemas.microsoft.com/office/drawing/2010/main" w="9525">
+                <a14:hiddenLine xmlns:a14="http://schemas.microsoft.com/office/drawing/2010/main" xmlns="" w="9525">
                   <a:solidFill>
                     <a:srgbClr val="000000"/>
                   </a:solidFill>
@@ -3084,7 +3102,7 @@
             </a:ln>
             <a:extLst>
               <a:ext uri="{91240B29-F687-4f45-9708-019B960494DF}">
-                <a14:hiddenLine xmlns="" xmlns:a14="http://schemas.microsoft.com/office/drawing/2010/main" w="9525">
+                <a14:hiddenLine xmlns:a14="http://schemas.microsoft.com/office/drawing/2010/main" xmlns="" w="9525">
                   <a:solidFill>
                     <a:srgbClr val="000000"/>
                   </a:solidFill>
@@ -3174,7 +3192,7 @@
             </a:ln>
             <a:extLst>
               <a:ext uri="{91240B29-F687-4f45-9708-019B960494DF}">
-                <a14:hiddenLine xmlns="" xmlns:a14="http://schemas.microsoft.com/office/drawing/2010/main" w="9525">
+                <a14:hiddenLine xmlns:a14="http://schemas.microsoft.com/office/drawing/2010/main" xmlns="" w="9525">
                   <a:solidFill>
                     <a:srgbClr val="000000"/>
                   </a:solidFill>
@@ -3208,7 +3226,7 @@
             </a:ln>
             <a:extLst>
               <a:ext uri="{91240B29-F687-4f45-9708-019B960494DF}">
-                <a14:hiddenLine xmlns="" xmlns:a14="http://schemas.microsoft.com/office/drawing/2010/main" w="9525">
+                <a14:hiddenLine xmlns:a14="http://schemas.microsoft.com/office/drawing/2010/main" xmlns="" w="9525">
                   <a:solidFill>
                     <a:srgbClr val="000000"/>
                   </a:solidFill>
@@ -3273,7 +3291,7 @@
             </a:ln>
             <a:extLst>
               <a:ext uri="{91240B29-F687-4f45-9708-019B960494DF}">
-                <a14:hiddenLine xmlns="" xmlns:a14="http://schemas.microsoft.com/office/drawing/2010/main" w="9525">
+                <a14:hiddenLine xmlns:a14="http://schemas.microsoft.com/office/drawing/2010/main" xmlns="" w="9525">
                   <a:solidFill>
                     <a:srgbClr val="000000"/>
                   </a:solidFill>
@@ -3363,7 +3381,7 @@
             </a:ln>
             <a:extLst>
               <a:ext uri="{91240B29-F687-4f45-9708-019B960494DF}">
-                <a14:hiddenLine xmlns="" xmlns:a14="http://schemas.microsoft.com/office/drawing/2010/main" w="9525">
+                <a14:hiddenLine xmlns:a14="http://schemas.microsoft.com/office/drawing/2010/main" xmlns="" w="9525">
                   <a:solidFill>
                     <a:srgbClr val="000000"/>
                   </a:solidFill>
@@ -3425,7 +3443,7 @@
             </a:ln>
             <a:extLst>
               <a:ext uri="{91240B29-F687-4f45-9708-019B960494DF}">
-                <a14:hiddenLine xmlns="" xmlns:a14="http://schemas.microsoft.com/office/drawing/2010/main" w="9525">
+                <a14:hiddenLine xmlns:a14="http://schemas.microsoft.com/office/drawing/2010/main" xmlns="" w="9525">
                   <a:solidFill>
                     <a:srgbClr val="000000"/>
                   </a:solidFill>
@@ -3515,7 +3533,7 @@
             </a:ln>
             <a:extLst>
               <a:ext uri="{91240B29-F687-4f45-9708-019B960494DF}">
-                <a14:hiddenLine xmlns="" xmlns:a14="http://schemas.microsoft.com/office/drawing/2010/main" w="9525">
+                <a14:hiddenLine xmlns:a14="http://schemas.microsoft.com/office/drawing/2010/main" xmlns="" w="9525">
                   <a:solidFill>
                     <a:srgbClr val="000000"/>
                   </a:solidFill>
@@ -3605,7 +3623,7 @@
             </a:ln>
             <a:extLst>
               <a:ext uri="{91240B29-F687-4f45-9708-019B960494DF}">
-                <a14:hiddenLine xmlns="" xmlns:a14="http://schemas.microsoft.com/office/drawing/2010/main" w="9525">
+                <a14:hiddenLine xmlns:a14="http://schemas.microsoft.com/office/drawing/2010/main" xmlns="" w="9525">
                   <a:solidFill>
                     <a:srgbClr val="000000"/>
                   </a:solidFill>
@@ -3670,7 +3688,7 @@
             </a:ln>
             <a:extLst>
               <a:ext uri="{91240B29-F687-4f45-9708-019B960494DF}">
-                <a14:hiddenLine xmlns="" xmlns:a14="http://schemas.microsoft.com/office/drawing/2010/main" w="9525">
+                <a14:hiddenLine xmlns:a14="http://schemas.microsoft.com/office/drawing/2010/main" xmlns="" w="9525">
                   <a:solidFill>
                     <a:srgbClr val="000000"/>
                   </a:solidFill>
@@ -3732,7 +3750,7 @@
             </a:ln>
             <a:extLst>
               <a:ext uri="{91240B29-F687-4f45-9708-019B960494DF}">
-                <a14:hiddenLine xmlns="" xmlns:a14="http://schemas.microsoft.com/office/drawing/2010/main" w="9525">
+                <a14:hiddenLine xmlns:a14="http://schemas.microsoft.com/office/drawing/2010/main" xmlns="" w="9525">
                   <a:solidFill>
                     <a:srgbClr val="000000"/>
                   </a:solidFill>
@@ -3822,7 +3840,7 @@
             </a:ln>
             <a:extLst>
               <a:ext uri="{91240B29-F687-4f45-9708-019B960494DF}">
-                <a14:hiddenLine xmlns="" xmlns:a14="http://schemas.microsoft.com/office/drawing/2010/main" w="9525">
+                <a14:hiddenLine xmlns:a14="http://schemas.microsoft.com/office/drawing/2010/main" xmlns="" w="9525">
                   <a:solidFill>
                     <a:srgbClr val="000000"/>
                   </a:solidFill>
@@ -3912,7 +3930,7 @@
             </a:ln>
             <a:extLst>
               <a:ext uri="{91240B29-F687-4f45-9708-019B960494DF}">
-                <a14:hiddenLine xmlns="" xmlns:a14="http://schemas.microsoft.com/office/drawing/2010/main" w="9525">
+                <a14:hiddenLine xmlns:a14="http://schemas.microsoft.com/office/drawing/2010/main" xmlns="" w="9525">
                   <a:solidFill>
                     <a:srgbClr val="000000"/>
                   </a:solidFill>
@@ -3974,7 +3992,7 @@
             </a:ln>
             <a:extLst>
               <a:ext uri="{91240B29-F687-4f45-9708-019B960494DF}">
-                <a14:hiddenLine xmlns="" xmlns:a14="http://schemas.microsoft.com/office/drawing/2010/main" w="9525">
+                <a14:hiddenLine xmlns:a14="http://schemas.microsoft.com/office/drawing/2010/main" xmlns="" w="9525">
                   <a:solidFill>
                     <a:srgbClr val="000000"/>
                   </a:solidFill>
@@ -4094,7 +4112,7 @@
             </a:ln>
             <a:extLst>
               <a:ext uri="{91240B29-F687-4f45-9708-019B960494DF}">
-                <a14:hiddenLine xmlns="" xmlns:a14="http://schemas.microsoft.com/office/drawing/2010/main" w="9525">
+                <a14:hiddenLine xmlns:a14="http://schemas.microsoft.com/office/drawing/2010/main" xmlns="" w="9525">
                   <a:solidFill>
                     <a:srgbClr val="000000"/>
                   </a:solidFill>
@@ -4162,7 +4180,7 @@
             </a:ln>
             <a:extLst>
               <a:ext uri="{91240B29-F687-4f45-9708-019B960494DF}">
-                <a14:hiddenLine xmlns="" xmlns:a14="http://schemas.microsoft.com/office/drawing/2010/main" w="9525">
+                <a14:hiddenLine xmlns:a14="http://schemas.microsoft.com/office/drawing/2010/main" xmlns="" w="9525">
                   <a:solidFill>
                     <a:srgbClr val="000000"/>
                   </a:solidFill>
@@ -4252,7 +4270,7 @@
             </a:ln>
             <a:extLst>
               <a:ext uri="{91240B29-F687-4f45-9708-019B960494DF}">
-                <a14:hiddenLine xmlns="" xmlns:a14="http://schemas.microsoft.com/office/drawing/2010/main" w="9525">
+                <a14:hiddenLine xmlns:a14="http://schemas.microsoft.com/office/drawing/2010/main" xmlns="" w="9525">
                   <a:solidFill>
                     <a:srgbClr val="000000"/>
                   </a:solidFill>
@@ -9059,7 +9077,7 @@
           <a:noFill/>
           <a:extLst>
             <a:ext uri="{909E8E84-426E-40dd-AFC4-6F175D3DCCD1}">
-              <a14:hiddenFill xmlns="" xmlns:a14="http://schemas.microsoft.com/office/drawing/2010/main">
+              <a14:hiddenFill xmlns:a14="http://schemas.microsoft.com/office/drawing/2010/main" xmlns="">
                 <a:solidFill>
                   <a:srgbClr val="FFFFFF"/>
                 </a:solidFill>
@@ -9133,7 +9151,7 @@
               </a:ln>
               <a:extLst>
                 <a:ext uri="{91240B29-F687-4f45-9708-019B960494DF}">
-                  <a14:hiddenLine xmlns="" xmlns:a14="http://schemas.microsoft.com/office/drawing/2010/main" w="9525">
+                  <a14:hiddenLine xmlns:a14="http://schemas.microsoft.com/office/drawing/2010/main" xmlns="" w="9525">
                     <a:solidFill>
                       <a:srgbClr val="000000"/>
                     </a:solidFill>
@@ -9223,7 +9241,7 @@
               </a:ln>
               <a:extLst>
                 <a:ext uri="{91240B29-F687-4f45-9708-019B960494DF}">
-                  <a14:hiddenLine xmlns="" xmlns:a14="http://schemas.microsoft.com/office/drawing/2010/main" w="9525">
+                  <a14:hiddenLine xmlns:a14="http://schemas.microsoft.com/office/drawing/2010/main" xmlns="" w="9525">
                     <a:solidFill>
                       <a:srgbClr val="000000"/>
                     </a:solidFill>
@@ -9313,7 +9331,7 @@
               </a:ln>
               <a:extLst>
                 <a:ext uri="{91240B29-F687-4f45-9708-019B960494DF}">
-                  <a14:hiddenLine xmlns="" xmlns:a14="http://schemas.microsoft.com/office/drawing/2010/main" w="9525">
+                  <a14:hiddenLine xmlns:a14="http://schemas.microsoft.com/office/drawing/2010/main" xmlns="" w="9525">
                     <a:solidFill>
                       <a:srgbClr val="000000"/>
                     </a:solidFill>
@@ -9375,7 +9393,7 @@
               </a:ln>
               <a:extLst>
                 <a:ext uri="{91240B29-F687-4f45-9708-019B960494DF}">
-                  <a14:hiddenLine xmlns="" xmlns:a14="http://schemas.microsoft.com/office/drawing/2010/main" w="9525">
+                  <a14:hiddenLine xmlns:a14="http://schemas.microsoft.com/office/drawing/2010/main" xmlns="" w="9525">
                     <a:solidFill>
                       <a:srgbClr val="000000"/>
                     </a:solidFill>
@@ -9465,7 +9483,7 @@
               </a:ln>
               <a:extLst>
                 <a:ext uri="{91240B29-F687-4f45-9708-019B960494DF}">
-                  <a14:hiddenLine xmlns="" xmlns:a14="http://schemas.microsoft.com/office/drawing/2010/main" w="9525">
+                  <a14:hiddenLine xmlns:a14="http://schemas.microsoft.com/office/drawing/2010/main" xmlns="" w="9525">
                     <a:solidFill>
                       <a:srgbClr val="000000"/>
                     </a:solidFill>
@@ -9527,7 +9545,7 @@
               </a:ln>
               <a:extLst>
                 <a:ext uri="{91240B29-F687-4f45-9708-019B960494DF}">
-                  <a14:hiddenLine xmlns="" xmlns:a14="http://schemas.microsoft.com/office/drawing/2010/main" w="9525">
+                  <a14:hiddenLine xmlns:a14="http://schemas.microsoft.com/office/drawing/2010/main" xmlns="" w="9525">
                     <a:solidFill>
                       <a:srgbClr val="000000"/>
                     </a:solidFill>
@@ -9589,7 +9607,7 @@
               </a:ln>
               <a:extLst>
                 <a:ext uri="{91240B29-F687-4f45-9708-019B960494DF}">
-                  <a14:hiddenLine xmlns="" xmlns:a14="http://schemas.microsoft.com/office/drawing/2010/main" w="9525">
+                  <a14:hiddenLine xmlns:a14="http://schemas.microsoft.com/office/drawing/2010/main" xmlns="" w="9525">
                     <a:solidFill>
                       <a:srgbClr val="000000"/>
                     </a:solidFill>
@@ -9679,7 +9697,7 @@
               </a:ln>
               <a:extLst>
                 <a:ext uri="{91240B29-F687-4f45-9708-019B960494DF}">
-                  <a14:hiddenLine xmlns="" xmlns:a14="http://schemas.microsoft.com/office/drawing/2010/main" w="9525">
+                  <a14:hiddenLine xmlns:a14="http://schemas.microsoft.com/office/drawing/2010/main" xmlns="" w="9525">
                     <a:solidFill>
                       <a:srgbClr val="000000"/>
                     </a:solidFill>
@@ -9769,7 +9787,7 @@
               </a:ln>
               <a:extLst>
                 <a:ext uri="{91240B29-F687-4f45-9708-019B960494DF}">
-                  <a14:hiddenLine xmlns="" xmlns:a14="http://schemas.microsoft.com/office/drawing/2010/main" w="9525">
+                  <a14:hiddenLine xmlns:a14="http://schemas.microsoft.com/office/drawing/2010/main" xmlns="" w="9525">
                     <a:solidFill>
                       <a:srgbClr val="000000"/>
                     </a:solidFill>
@@ -9831,7 +9849,7 @@
               </a:ln>
               <a:extLst>
                 <a:ext uri="{91240B29-F687-4f45-9708-019B960494DF}">
-                  <a14:hiddenLine xmlns="" xmlns:a14="http://schemas.microsoft.com/office/drawing/2010/main" w="9525">
+                  <a14:hiddenLine xmlns:a14="http://schemas.microsoft.com/office/drawing/2010/main" xmlns="" w="9525">
                     <a:solidFill>
                       <a:srgbClr val="000000"/>
                     </a:solidFill>
@@ -9941,7 +9959,7 @@
               </a:ln>
               <a:extLst>
                 <a:ext uri="{91240B29-F687-4f45-9708-019B960494DF}">
-                  <a14:hiddenLine xmlns="" xmlns:a14="http://schemas.microsoft.com/office/drawing/2010/main" w="9525">
+                  <a14:hiddenLine xmlns:a14="http://schemas.microsoft.com/office/drawing/2010/main" xmlns="" w="9525">
                     <a:solidFill>
                       <a:srgbClr val="000000"/>
                     </a:solidFill>
@@ -10025,7 +10043,7 @@
               </a:ln>
               <a:extLst>
                 <a:ext uri="{91240B29-F687-4f45-9708-019B960494DF}">
-                  <a14:hiddenLine xmlns="" xmlns:a14="http://schemas.microsoft.com/office/drawing/2010/main" w="9525">
+                  <a14:hiddenLine xmlns:a14="http://schemas.microsoft.com/office/drawing/2010/main" xmlns="" w="9525">
                     <a:solidFill>
                       <a:srgbClr val="000000"/>
                     </a:solidFill>
@@ -10087,7 +10105,7 @@
               </a:ln>
               <a:extLst>
                 <a:ext uri="{91240B29-F687-4f45-9708-019B960494DF}">
-                  <a14:hiddenLine xmlns="" xmlns:a14="http://schemas.microsoft.com/office/drawing/2010/main" w="9525">
+                  <a14:hiddenLine xmlns:a14="http://schemas.microsoft.com/office/drawing/2010/main" xmlns="" w="9525">
                     <a:solidFill>
                       <a:srgbClr val="000000"/>
                     </a:solidFill>
@@ -10149,7 +10167,7 @@
               </a:ln>
               <a:extLst>
                 <a:ext uri="{91240B29-F687-4f45-9708-019B960494DF}">
-                  <a14:hiddenLine xmlns="" xmlns:a14="http://schemas.microsoft.com/office/drawing/2010/main" w="9525">
+                  <a14:hiddenLine xmlns:a14="http://schemas.microsoft.com/office/drawing/2010/main" xmlns="" w="9525">
                     <a:solidFill>
                       <a:srgbClr val="000000"/>
                     </a:solidFill>
@@ -10239,7 +10257,7 @@
               </a:ln>
               <a:extLst>
                 <a:ext uri="{91240B29-F687-4f45-9708-019B960494DF}">
-                  <a14:hiddenLine xmlns="" xmlns:a14="http://schemas.microsoft.com/office/drawing/2010/main" w="9525">
+                  <a14:hiddenLine xmlns:a14="http://schemas.microsoft.com/office/drawing/2010/main" xmlns="" w="9525">
                     <a:solidFill>
                       <a:srgbClr val="000000"/>
                     </a:solidFill>
@@ -10273,7 +10291,7 @@
               </a:ln>
               <a:extLst>
                 <a:ext uri="{91240B29-F687-4f45-9708-019B960494DF}">
-                  <a14:hiddenLine xmlns="" xmlns:a14="http://schemas.microsoft.com/office/drawing/2010/main" w="9525">
+                  <a14:hiddenLine xmlns:a14="http://schemas.microsoft.com/office/drawing/2010/main" xmlns="" w="9525">
                     <a:solidFill>
                       <a:srgbClr val="000000"/>
                     </a:solidFill>
@@ -10338,7 +10356,7 @@
               </a:ln>
               <a:extLst>
                 <a:ext uri="{91240B29-F687-4f45-9708-019B960494DF}">
-                  <a14:hiddenLine xmlns="" xmlns:a14="http://schemas.microsoft.com/office/drawing/2010/main" w="9525">
+                  <a14:hiddenLine xmlns:a14="http://schemas.microsoft.com/office/drawing/2010/main" xmlns="" w="9525">
                     <a:solidFill>
                       <a:srgbClr val="000000"/>
                     </a:solidFill>
@@ -10428,7 +10446,7 @@
               </a:ln>
               <a:extLst>
                 <a:ext uri="{91240B29-F687-4f45-9708-019B960494DF}">
-                  <a14:hiddenLine xmlns="" xmlns:a14="http://schemas.microsoft.com/office/drawing/2010/main" w="9525">
+                  <a14:hiddenLine xmlns:a14="http://schemas.microsoft.com/office/drawing/2010/main" xmlns="" w="9525">
                     <a:solidFill>
                       <a:srgbClr val="000000"/>
                     </a:solidFill>
@@ -10490,7 +10508,7 @@
               </a:ln>
               <a:extLst>
                 <a:ext uri="{91240B29-F687-4f45-9708-019B960494DF}">
-                  <a14:hiddenLine xmlns="" xmlns:a14="http://schemas.microsoft.com/office/drawing/2010/main" w="9525">
+                  <a14:hiddenLine xmlns:a14="http://schemas.microsoft.com/office/drawing/2010/main" xmlns="" w="9525">
                     <a:solidFill>
                       <a:srgbClr val="000000"/>
                     </a:solidFill>
@@ -10580,7 +10598,7 @@
               </a:ln>
               <a:extLst>
                 <a:ext uri="{91240B29-F687-4f45-9708-019B960494DF}">
-                  <a14:hiddenLine xmlns="" xmlns:a14="http://schemas.microsoft.com/office/drawing/2010/main" w="9525">
+                  <a14:hiddenLine xmlns:a14="http://schemas.microsoft.com/office/drawing/2010/main" xmlns="" w="9525">
                     <a:solidFill>
                       <a:srgbClr val="000000"/>
                     </a:solidFill>
@@ -10645,7 +10663,7 @@
               </a:ln>
               <a:extLst>
                 <a:ext uri="{91240B29-F687-4f45-9708-019B960494DF}">
-                  <a14:hiddenLine xmlns="" xmlns:a14="http://schemas.microsoft.com/office/drawing/2010/main" w="9525">
+                  <a14:hiddenLine xmlns:a14="http://schemas.microsoft.com/office/drawing/2010/main" xmlns="" w="9525">
                     <a:solidFill>
                       <a:srgbClr val="000000"/>
                     </a:solidFill>
@@ -10707,7 +10725,7 @@
               </a:ln>
               <a:extLst>
                 <a:ext uri="{91240B29-F687-4f45-9708-019B960494DF}">
-                  <a14:hiddenLine xmlns="" xmlns:a14="http://schemas.microsoft.com/office/drawing/2010/main" w="9525">
+                  <a14:hiddenLine xmlns:a14="http://schemas.microsoft.com/office/drawing/2010/main" xmlns="" w="9525">
                     <a:solidFill>
                       <a:srgbClr val="000000"/>
                     </a:solidFill>
@@ -10797,7 +10815,7 @@
               </a:ln>
               <a:extLst>
                 <a:ext uri="{91240B29-F687-4f45-9708-019B960494DF}">
-                  <a14:hiddenLine xmlns="" xmlns:a14="http://schemas.microsoft.com/office/drawing/2010/main" w="9525">
+                  <a14:hiddenLine xmlns:a14="http://schemas.microsoft.com/office/drawing/2010/main" xmlns="" w="9525">
                     <a:solidFill>
                       <a:srgbClr val="000000"/>
                     </a:solidFill>
@@ -10887,7 +10905,7 @@
               </a:ln>
               <a:extLst>
                 <a:ext uri="{91240B29-F687-4f45-9708-019B960494DF}">
-                  <a14:hiddenLine xmlns="" xmlns:a14="http://schemas.microsoft.com/office/drawing/2010/main" w="9525">
+                  <a14:hiddenLine xmlns:a14="http://schemas.microsoft.com/office/drawing/2010/main" xmlns="" w="9525">
                     <a:solidFill>
                       <a:srgbClr val="000000"/>
                     </a:solidFill>
@@ -10952,7 +10970,7 @@
               </a:ln>
               <a:extLst>
                 <a:ext uri="{91240B29-F687-4f45-9708-019B960494DF}">
-                  <a14:hiddenLine xmlns="" xmlns:a14="http://schemas.microsoft.com/office/drawing/2010/main" w="9525">
+                  <a14:hiddenLine xmlns:a14="http://schemas.microsoft.com/office/drawing/2010/main" xmlns="" w="9525">
                     <a:solidFill>
                       <a:srgbClr val="000000"/>
                     </a:solidFill>
@@ -11072,7 +11090,7 @@
               </a:ln>
               <a:extLst>
                 <a:ext uri="{91240B29-F687-4f45-9708-019B960494DF}">
-                  <a14:hiddenLine xmlns="" xmlns:a14="http://schemas.microsoft.com/office/drawing/2010/main" w="9525">
+                  <a14:hiddenLine xmlns:a14="http://schemas.microsoft.com/office/drawing/2010/main" xmlns="" w="9525">
                     <a:solidFill>
                       <a:srgbClr val="000000"/>
                     </a:solidFill>
@@ -11170,7 +11188,7 @@
               </a:ln>
               <a:extLst>
                 <a:ext uri="{91240B29-F687-4f45-9708-019B960494DF}">
-                  <a14:hiddenLine xmlns="" xmlns:a14="http://schemas.microsoft.com/office/drawing/2010/main" w="9525">
+                  <a14:hiddenLine xmlns:a14="http://schemas.microsoft.com/office/drawing/2010/main" xmlns="" w="9525">
                     <a:solidFill>
                       <a:srgbClr val="000000"/>
                     </a:solidFill>
@@ -11285,7 +11303,7 @@
               </a:ln>
               <a:extLst>
                 <a:ext uri="{91240B29-F687-4f45-9708-019B960494DF}">
-                  <a14:hiddenLine xmlns="" xmlns:a14="http://schemas.microsoft.com/office/drawing/2010/main" w="9525">
+                  <a14:hiddenLine xmlns:a14="http://schemas.microsoft.com/office/drawing/2010/main" xmlns="" w="9525">
                     <a:solidFill>
                       <a:srgbClr val="000000"/>
                     </a:solidFill>
@@ -11375,7 +11393,7 @@
               </a:ln>
               <a:extLst>
                 <a:ext uri="{91240B29-F687-4f45-9708-019B960494DF}">
-                  <a14:hiddenLine xmlns="" xmlns:a14="http://schemas.microsoft.com/office/drawing/2010/main" w="9525">
+                  <a14:hiddenLine xmlns:a14="http://schemas.microsoft.com/office/drawing/2010/main" xmlns="" w="9525">
                     <a:solidFill>
                       <a:srgbClr val="000000"/>
                     </a:solidFill>
@@ -11440,7 +11458,7 @@
               </a:ln>
               <a:extLst>
                 <a:ext uri="{91240B29-F687-4f45-9708-019B960494DF}">
-                  <a14:hiddenLine xmlns="" xmlns:a14="http://schemas.microsoft.com/office/drawing/2010/main" w="9525">
+                  <a14:hiddenLine xmlns:a14="http://schemas.microsoft.com/office/drawing/2010/main" xmlns="" w="9525">
                     <a:solidFill>
                       <a:srgbClr val="000000"/>
                     </a:solidFill>
@@ -11530,7 +11548,7 @@
               </a:ln>
               <a:extLst>
                 <a:ext uri="{91240B29-F687-4f45-9708-019B960494DF}">
-                  <a14:hiddenLine xmlns="" xmlns:a14="http://schemas.microsoft.com/office/drawing/2010/main" w="9525">
+                  <a14:hiddenLine xmlns:a14="http://schemas.microsoft.com/office/drawing/2010/main" xmlns="" w="9525">
                     <a:solidFill>
                       <a:srgbClr val="000000"/>
                     </a:solidFill>
@@ -11598,7 +11616,7 @@
               </a:ln>
               <a:extLst>
                 <a:ext uri="{91240B29-F687-4f45-9708-019B960494DF}">
-                  <a14:hiddenLine xmlns="" xmlns:a14="http://schemas.microsoft.com/office/drawing/2010/main" w="9525">
+                  <a14:hiddenLine xmlns:a14="http://schemas.microsoft.com/office/drawing/2010/main" xmlns="" w="9525">
                     <a:solidFill>
                       <a:srgbClr val="000000"/>
                     </a:solidFill>
@@ -11688,7 +11706,7 @@
               </a:ln>
               <a:extLst>
                 <a:ext uri="{91240B29-F687-4f45-9708-019B960494DF}">
-                  <a14:hiddenLine xmlns="" xmlns:a14="http://schemas.microsoft.com/office/drawing/2010/main" w="9525">
+                  <a14:hiddenLine xmlns:a14="http://schemas.microsoft.com/office/drawing/2010/main" xmlns="" w="9525">
                     <a:solidFill>
                       <a:srgbClr val="000000"/>
                     </a:solidFill>
@@ -11756,7 +11774,7 @@
               </a:ln>
               <a:extLst>
                 <a:ext uri="{91240B29-F687-4f45-9708-019B960494DF}">
-                  <a14:hiddenLine xmlns="" xmlns:a14="http://schemas.microsoft.com/office/drawing/2010/main" w="9525">
+                  <a14:hiddenLine xmlns:a14="http://schemas.microsoft.com/office/drawing/2010/main" xmlns="" w="9525">
                     <a:solidFill>
                       <a:srgbClr val="000000"/>
                     </a:solidFill>
@@ -11846,7 +11864,7 @@
               </a:ln>
               <a:extLst>
                 <a:ext uri="{91240B29-F687-4f45-9708-019B960494DF}">
-                  <a14:hiddenLine xmlns="" xmlns:a14="http://schemas.microsoft.com/office/drawing/2010/main" w="9525">
+                  <a14:hiddenLine xmlns:a14="http://schemas.microsoft.com/office/drawing/2010/main" xmlns="" w="9525">
                     <a:solidFill>
                       <a:srgbClr val="000000"/>
                     </a:solidFill>
@@ -11880,7 +11898,7 @@
               </a:ln>
               <a:extLst>
                 <a:ext uri="{91240B29-F687-4f45-9708-019B960494DF}">
-                  <a14:hiddenLine xmlns="" xmlns:a14="http://schemas.microsoft.com/office/drawing/2010/main" w="9525">
+                  <a14:hiddenLine xmlns:a14="http://schemas.microsoft.com/office/drawing/2010/main" xmlns="" w="9525">
                     <a:solidFill>
                       <a:srgbClr val="000000"/>
                     </a:solidFill>
@@ -12505,6 +12523,3028 @@
 </p:sld>
 </file>
 
+<file path=ppt/slides/slide10.xml><?xml version="1.0" encoding="utf-8"?>
+<p:sld xmlns:a="http://schemas.openxmlformats.org/drawingml/2006/main" xmlns:r="http://schemas.openxmlformats.org/officeDocument/2006/relationships" xmlns:p="http://schemas.openxmlformats.org/presentationml/2006/main">
+  <p:cSld>
+    <p:spTree>
+      <p:nvGrpSpPr>
+        <p:cNvPr id="1" name=""/>
+        <p:cNvGrpSpPr/>
+        <p:nvPr/>
+      </p:nvGrpSpPr>
+      <p:grpSpPr>
+        <a:xfrm>
+          <a:off x="0" y="0"/>
+          <a:ext cx="0" cy="0"/>
+          <a:chOff x="0" y="0"/>
+          <a:chExt cx="0" cy="0"/>
+        </a:xfrm>
+      </p:grpSpPr>
+      <p:sp>
+        <p:nvSpPr>
+          <p:cNvPr id="2" name="Title 1"/>
+          <p:cNvSpPr>
+            <a:spLocks noGrp="1"/>
+          </p:cNvSpPr>
+          <p:nvPr>
+            <p:ph type="title"/>
+          </p:nvPr>
+        </p:nvSpPr>
+        <p:spPr/>
+        <p:txBody>
+          <a:bodyPr/>
+          <a:lstStyle/>
+          <a:p>
+            <a:pPr algn="ctr"/>
+            <a:r>
+              <a:rPr lang="bg-BG" dirty="0"/>
+              <a:t>Сложност на </a:t>
+            </a:r>
+            <a:r>
+              <a:rPr lang="bg-BG" dirty="0" smtClean="0"/>
+              <a:t>алгоритъм</a:t>
+            </a:r>
+            <a:r>
+              <a:rPr lang="en-US" dirty="0" smtClean="0"/>
+              <a:t> </a:t>
+            </a:r>
+            <a:r>
+              <a:rPr lang="bg-BG" dirty="0" smtClean="0"/>
+              <a:t>демо</a:t>
+            </a:r>
+            <a:endParaRPr lang="en-US" dirty="0"/>
+          </a:p>
+        </p:txBody>
+      </p:sp>
+      <p:pic>
+        <p:nvPicPr>
+          <p:cNvPr id="1026" name="Picture 2" descr="http://hplusmagazine.com/sites/default/files/images/articles/jan10/cartoon-algorithm-art.jpg"/>
+          <p:cNvPicPr>
+            <a:picLocks noChangeAspect="1" noChangeArrowheads="1"/>
+          </p:cNvPicPr>
+          <p:nvPr/>
+        </p:nvPicPr>
+        <p:blipFill>
+          <a:blip r:embed="rId2">
+            <a:extLst>
+              <a:ext uri="{28A0092B-C50C-407E-A947-70E740481C1C}">
+                <a14:useLocalDpi xmlns:a14="http://schemas.microsoft.com/office/drawing/2010/main" val="0"/>
+              </a:ext>
+            </a:extLst>
+          </a:blip>
+          <a:srcRect/>
+          <a:stretch>
+            <a:fillRect/>
+          </a:stretch>
+        </p:blipFill>
+        <p:spPr bwMode="auto">
+          <a:xfrm>
+            <a:off x="3952102" y="2097088"/>
+            <a:ext cx="4284619" cy="4284619"/>
+          </a:xfrm>
+          <a:prstGeom prst="rect">
+            <a:avLst/>
+          </a:prstGeom>
+          <a:noFill/>
+          <a:extLst>
+            <a:ext uri="{909E8E84-426E-40DD-AFC4-6F175D3DCCD1}">
+              <a14:hiddenFill xmlns:a14="http://schemas.microsoft.com/office/drawing/2010/main">
+                <a:solidFill>
+                  <a:srgbClr val="FFFFFF"/>
+                </a:solidFill>
+              </a14:hiddenFill>
+            </a:ext>
+          </a:extLst>
+        </p:spPr>
+      </p:pic>
+    </p:spTree>
+    <p:extLst>
+      <p:ext uri="{BB962C8B-B14F-4D97-AF65-F5344CB8AC3E}">
+        <p14:creationId xmlns:p14="http://schemas.microsoft.com/office/powerpoint/2010/main" val="264288653"/>
+      </p:ext>
+    </p:extLst>
+  </p:cSld>
+  <p:clrMapOvr>
+    <a:masterClrMapping/>
+  </p:clrMapOvr>
+</p:sld>
+</file>
+
+<file path=ppt/slides/slide11.xml><?xml version="1.0" encoding="utf-8"?>
+<p:sld xmlns:a="http://schemas.openxmlformats.org/drawingml/2006/main" xmlns:r="http://schemas.openxmlformats.org/officeDocument/2006/relationships" xmlns:p="http://schemas.openxmlformats.org/presentationml/2006/main">
+  <p:cSld>
+    <p:spTree>
+      <p:nvGrpSpPr>
+        <p:cNvPr id="1" name=""/>
+        <p:cNvGrpSpPr/>
+        <p:nvPr/>
+      </p:nvGrpSpPr>
+      <p:grpSpPr>
+        <a:xfrm>
+          <a:off x="0" y="0"/>
+          <a:ext cx="0" cy="0"/>
+          <a:chOff x="0" y="0"/>
+          <a:chExt cx="0" cy="0"/>
+        </a:xfrm>
+      </p:grpSpPr>
+      <p:sp>
+        <p:nvSpPr>
+          <p:cNvPr id="2" name="Title 1"/>
+          <p:cNvSpPr>
+            <a:spLocks noGrp="1"/>
+          </p:cNvSpPr>
+          <p:nvPr>
+            <p:ph type="title"/>
+          </p:nvPr>
+        </p:nvSpPr>
+        <p:spPr>
+          <a:xfrm>
+            <a:off x="836613" y="164756"/>
+            <a:ext cx="9905998" cy="790833"/>
+          </a:xfrm>
+        </p:spPr>
+        <p:txBody>
+          <a:bodyPr/>
+          <a:lstStyle/>
+          <a:p>
+            <a:pPr algn="ctr"/>
+            <a:r>
+              <a:rPr lang="bg-BG" dirty="0" smtClean="0"/>
+              <a:t>Видове сложност на алгоритъм</a:t>
+            </a:r>
+            <a:endParaRPr lang="en-US" dirty="0"/>
+          </a:p>
+        </p:txBody>
+      </p:sp>
+      <p:graphicFrame>
+        <p:nvGraphicFramePr>
+          <p:cNvPr id="5" name="Table 4"/>
+          <p:cNvGraphicFramePr>
+            <a:graphicFrameLocks noGrp="1"/>
+          </p:cNvGraphicFramePr>
+          <p:nvPr>
+            <p:extLst>
+              <p:ext uri="{D42A27DB-BD31-4B8C-83A1-F6EECF244321}">
+                <p14:modId xmlns:p14="http://schemas.microsoft.com/office/powerpoint/2010/main" val="1471100161"/>
+              </p:ext>
+            </p:extLst>
+          </p:nvPr>
+        </p:nvGraphicFramePr>
+        <p:xfrm>
+          <a:off x="683733" y="1425147"/>
+          <a:ext cx="10750384" cy="4923674"/>
+        </p:xfrm>
+        <a:graphic>
+          <a:graphicData uri="http://schemas.openxmlformats.org/drawingml/2006/table">
+            <a:tbl>
+              <a:tblPr firstRow="1" bandRow="1">
+                <a:tableStyleId>{7DF18680-E054-41AD-8BC1-D1AEF772440D}</a:tableStyleId>
+              </a:tblPr>
+              <a:tblGrid>
+                <a:gridCol w="1343798"/>
+                <a:gridCol w="1343798"/>
+                <a:gridCol w="1343798"/>
+                <a:gridCol w="1343798"/>
+                <a:gridCol w="1343798"/>
+                <a:gridCol w="1343798"/>
+                <a:gridCol w="1343798"/>
+                <a:gridCol w="1343798"/>
+              </a:tblGrid>
+              <a:tr h="564834">
+                <a:tc>
+                  <a:txBody>
+                    <a:bodyPr/>
+                    <a:lstStyle/>
+                    <a:p>
+                      <a:r>
+                        <a:rPr lang="bg-BG" dirty="0" smtClean="0"/>
+                        <a:t>Сложност</a:t>
+                      </a:r>
+                      <a:endParaRPr lang="en-US" dirty="0"/>
+                    </a:p>
+                  </a:txBody>
+                  <a:tcPr/>
+                </a:tc>
+                <a:tc>
+                  <a:txBody>
+                    <a:bodyPr/>
+                    <a:lstStyle/>
+                    <a:p>
+                      <a:r>
+                        <a:rPr lang="bg-BG" dirty="0" smtClean="0"/>
+                        <a:t>10</a:t>
+                      </a:r>
+                      <a:endParaRPr lang="en-US" dirty="0"/>
+                    </a:p>
+                  </a:txBody>
+                  <a:tcPr/>
+                </a:tc>
+                <a:tc>
+                  <a:txBody>
+                    <a:bodyPr/>
+                    <a:lstStyle/>
+                    <a:p>
+                      <a:r>
+                        <a:rPr lang="bg-BG" dirty="0" smtClean="0"/>
+                        <a:t>20</a:t>
+                      </a:r>
+                      <a:endParaRPr lang="en-US" dirty="0"/>
+                    </a:p>
+                  </a:txBody>
+                  <a:tcPr/>
+                </a:tc>
+                <a:tc>
+                  <a:txBody>
+                    <a:bodyPr/>
+                    <a:lstStyle/>
+                    <a:p>
+                      <a:r>
+                        <a:rPr lang="bg-BG" dirty="0" smtClean="0"/>
+                        <a:t>50</a:t>
+                      </a:r>
+                      <a:endParaRPr lang="en-US" dirty="0"/>
+                    </a:p>
+                  </a:txBody>
+                  <a:tcPr/>
+                </a:tc>
+                <a:tc>
+                  <a:txBody>
+                    <a:bodyPr/>
+                    <a:lstStyle/>
+                    <a:p>
+                      <a:r>
+                        <a:rPr lang="bg-BG" dirty="0" smtClean="0"/>
+                        <a:t>100</a:t>
+                      </a:r>
+                      <a:endParaRPr lang="en-US" dirty="0"/>
+                    </a:p>
+                  </a:txBody>
+                  <a:tcPr/>
+                </a:tc>
+                <a:tc>
+                  <a:txBody>
+                    <a:bodyPr/>
+                    <a:lstStyle/>
+                    <a:p>
+                      <a:r>
+                        <a:rPr lang="bg-BG" dirty="0" smtClean="0"/>
+                        <a:t>1 000</a:t>
+                      </a:r>
+                      <a:endParaRPr lang="en-US" dirty="0"/>
+                    </a:p>
+                  </a:txBody>
+                  <a:tcPr/>
+                </a:tc>
+                <a:tc>
+                  <a:txBody>
+                    <a:bodyPr/>
+                    <a:lstStyle/>
+                    <a:p>
+                      <a:r>
+                        <a:rPr lang="bg-BG" dirty="0" smtClean="0"/>
+                        <a:t>10 000</a:t>
+                      </a:r>
+                      <a:endParaRPr lang="en-US" dirty="0"/>
+                    </a:p>
+                  </a:txBody>
+                  <a:tcPr/>
+                </a:tc>
+                <a:tc>
+                  <a:txBody>
+                    <a:bodyPr/>
+                    <a:lstStyle/>
+                    <a:p>
+                      <a:r>
+                        <a:rPr lang="bg-BG" dirty="0" smtClean="0"/>
+                        <a:t>100 000</a:t>
+                      </a:r>
+                      <a:endParaRPr lang="en-US" dirty="0"/>
+                    </a:p>
+                  </a:txBody>
+                  <a:tcPr/>
+                </a:tc>
+              </a:tr>
+              <a:tr h="487720">
+                <a:tc>
+                  <a:txBody>
+                    <a:bodyPr/>
+                    <a:lstStyle/>
+                    <a:p>
+                      <a:r>
+                        <a:rPr lang="bg-BG" dirty="0" smtClean="0"/>
+                        <a:t>О(1)</a:t>
+                      </a:r>
+                      <a:endParaRPr lang="en-US" dirty="0"/>
+                    </a:p>
+                  </a:txBody>
+                  <a:tcPr/>
+                </a:tc>
+                <a:tc>
+                  <a:txBody>
+                    <a:bodyPr/>
+                    <a:lstStyle/>
+                    <a:p>
+                      <a:r>
+                        <a:rPr lang="en-US" dirty="0" smtClean="0"/>
+                        <a:t>&lt; 1</a:t>
+                      </a:r>
+                      <a:r>
+                        <a:rPr lang="bg-BG" dirty="0" smtClean="0"/>
+                        <a:t>сек</a:t>
+                      </a:r>
+                      <a:endParaRPr lang="en-US" dirty="0"/>
+                    </a:p>
+                  </a:txBody>
+                  <a:tcPr/>
+                </a:tc>
+                <a:tc>
+                  <a:txBody>
+                    <a:bodyPr/>
+                    <a:lstStyle/>
+                    <a:p>
+                      <a:pPr marL="0" marR="0" indent="0" algn="l" defTabSz="914400" rtl="0" eaLnBrk="1" fontAlgn="auto" latinLnBrk="0" hangingPunct="1">
+                        <a:lnSpc>
+                          <a:spcPct val="100000"/>
+                        </a:lnSpc>
+                        <a:spcBef>
+                          <a:spcPts val="0"/>
+                        </a:spcBef>
+                        <a:spcAft>
+                          <a:spcPts val="0"/>
+                        </a:spcAft>
+                        <a:buClrTx/>
+                        <a:buSzTx/>
+                        <a:buFontTx/>
+                        <a:buNone/>
+                        <a:tabLst/>
+                        <a:defRPr/>
+                      </a:pPr>
+                      <a:r>
+                        <a:rPr lang="en-US" dirty="0" smtClean="0"/>
+                        <a:t>&lt; 1</a:t>
+                      </a:r>
+                      <a:r>
+                        <a:rPr lang="bg-BG" dirty="0" smtClean="0"/>
+                        <a:t>сек</a:t>
+                      </a:r>
+                      <a:endParaRPr lang="en-US" dirty="0" smtClean="0"/>
+                    </a:p>
+                  </a:txBody>
+                  <a:tcPr/>
+                </a:tc>
+                <a:tc>
+                  <a:txBody>
+                    <a:bodyPr/>
+                    <a:lstStyle/>
+                    <a:p>
+                      <a:pPr marL="0" marR="0" indent="0" algn="l" defTabSz="914400" rtl="0" eaLnBrk="1" fontAlgn="auto" latinLnBrk="0" hangingPunct="1">
+                        <a:lnSpc>
+                          <a:spcPct val="100000"/>
+                        </a:lnSpc>
+                        <a:spcBef>
+                          <a:spcPts val="0"/>
+                        </a:spcBef>
+                        <a:spcAft>
+                          <a:spcPts val="0"/>
+                        </a:spcAft>
+                        <a:buClrTx/>
+                        <a:buSzTx/>
+                        <a:buFontTx/>
+                        <a:buNone/>
+                        <a:tabLst/>
+                        <a:defRPr/>
+                      </a:pPr>
+                      <a:r>
+                        <a:rPr lang="en-US" dirty="0" smtClean="0"/>
+                        <a:t>&lt; 1</a:t>
+                      </a:r>
+                      <a:r>
+                        <a:rPr lang="bg-BG" dirty="0" smtClean="0"/>
+                        <a:t>сек</a:t>
+                      </a:r>
+                      <a:endParaRPr lang="en-US" dirty="0" smtClean="0"/>
+                    </a:p>
+                  </a:txBody>
+                  <a:tcPr/>
+                </a:tc>
+                <a:tc>
+                  <a:txBody>
+                    <a:bodyPr/>
+                    <a:lstStyle/>
+                    <a:p>
+                      <a:pPr marL="0" marR="0" indent="0" algn="l" defTabSz="914400" rtl="0" eaLnBrk="1" fontAlgn="auto" latinLnBrk="0" hangingPunct="1">
+                        <a:lnSpc>
+                          <a:spcPct val="100000"/>
+                        </a:lnSpc>
+                        <a:spcBef>
+                          <a:spcPts val="0"/>
+                        </a:spcBef>
+                        <a:spcAft>
+                          <a:spcPts val="0"/>
+                        </a:spcAft>
+                        <a:buClrTx/>
+                        <a:buSzTx/>
+                        <a:buFontTx/>
+                        <a:buNone/>
+                        <a:tabLst/>
+                        <a:defRPr/>
+                      </a:pPr>
+                      <a:r>
+                        <a:rPr lang="en-US" dirty="0" smtClean="0"/>
+                        <a:t>&lt; 1</a:t>
+                      </a:r>
+                      <a:r>
+                        <a:rPr lang="bg-BG" dirty="0" smtClean="0"/>
+                        <a:t>сек</a:t>
+                      </a:r>
+                      <a:endParaRPr lang="en-US" dirty="0" smtClean="0"/>
+                    </a:p>
+                  </a:txBody>
+                  <a:tcPr/>
+                </a:tc>
+                <a:tc>
+                  <a:txBody>
+                    <a:bodyPr/>
+                    <a:lstStyle/>
+                    <a:p>
+                      <a:pPr marL="0" marR="0" indent="0" algn="l" defTabSz="914400" rtl="0" eaLnBrk="1" fontAlgn="auto" latinLnBrk="0" hangingPunct="1">
+                        <a:lnSpc>
+                          <a:spcPct val="100000"/>
+                        </a:lnSpc>
+                        <a:spcBef>
+                          <a:spcPts val="0"/>
+                        </a:spcBef>
+                        <a:spcAft>
+                          <a:spcPts val="0"/>
+                        </a:spcAft>
+                        <a:buClrTx/>
+                        <a:buSzTx/>
+                        <a:buFontTx/>
+                        <a:buNone/>
+                        <a:tabLst/>
+                        <a:defRPr/>
+                      </a:pPr>
+                      <a:r>
+                        <a:rPr lang="en-US" dirty="0" smtClean="0"/>
+                        <a:t>&lt; 1</a:t>
+                      </a:r>
+                      <a:r>
+                        <a:rPr lang="bg-BG" dirty="0" smtClean="0"/>
+                        <a:t>сек</a:t>
+                      </a:r>
+                      <a:endParaRPr lang="en-US" dirty="0" smtClean="0"/>
+                    </a:p>
+                  </a:txBody>
+                  <a:tcPr/>
+                </a:tc>
+                <a:tc>
+                  <a:txBody>
+                    <a:bodyPr/>
+                    <a:lstStyle/>
+                    <a:p>
+                      <a:pPr marL="0" marR="0" indent="0" algn="l" defTabSz="914400" rtl="0" eaLnBrk="1" fontAlgn="auto" latinLnBrk="0" hangingPunct="1">
+                        <a:lnSpc>
+                          <a:spcPct val="100000"/>
+                        </a:lnSpc>
+                        <a:spcBef>
+                          <a:spcPts val="0"/>
+                        </a:spcBef>
+                        <a:spcAft>
+                          <a:spcPts val="0"/>
+                        </a:spcAft>
+                        <a:buClrTx/>
+                        <a:buSzTx/>
+                        <a:buFontTx/>
+                        <a:buNone/>
+                        <a:tabLst/>
+                        <a:defRPr/>
+                      </a:pPr>
+                      <a:r>
+                        <a:rPr lang="en-US" dirty="0" smtClean="0"/>
+                        <a:t>&lt; 1</a:t>
+                      </a:r>
+                      <a:r>
+                        <a:rPr lang="bg-BG" dirty="0" smtClean="0"/>
+                        <a:t>сек</a:t>
+                      </a:r>
+                      <a:endParaRPr lang="en-US" dirty="0" smtClean="0"/>
+                    </a:p>
+                  </a:txBody>
+                  <a:tcPr/>
+                </a:tc>
+                <a:tc>
+                  <a:txBody>
+                    <a:bodyPr/>
+                    <a:lstStyle/>
+                    <a:p>
+                      <a:pPr marL="0" marR="0" indent="0" algn="l" defTabSz="914400" rtl="0" eaLnBrk="1" fontAlgn="auto" latinLnBrk="0" hangingPunct="1">
+                        <a:lnSpc>
+                          <a:spcPct val="100000"/>
+                        </a:lnSpc>
+                        <a:spcBef>
+                          <a:spcPts val="0"/>
+                        </a:spcBef>
+                        <a:spcAft>
+                          <a:spcPts val="0"/>
+                        </a:spcAft>
+                        <a:buClrTx/>
+                        <a:buSzTx/>
+                        <a:buFontTx/>
+                        <a:buNone/>
+                        <a:tabLst/>
+                        <a:defRPr/>
+                      </a:pPr>
+                      <a:r>
+                        <a:rPr lang="en-US" dirty="0" smtClean="0"/>
+                        <a:t>&lt; 1</a:t>
+                      </a:r>
+                      <a:r>
+                        <a:rPr lang="bg-BG" dirty="0" smtClean="0"/>
+                        <a:t>сек</a:t>
+                      </a:r>
+                      <a:endParaRPr lang="en-US" dirty="0" smtClean="0"/>
+                    </a:p>
+                  </a:txBody>
+                  <a:tcPr/>
+                </a:tc>
+              </a:tr>
+              <a:tr h="487720">
+                <a:tc>
+                  <a:txBody>
+                    <a:bodyPr/>
+                    <a:lstStyle/>
+                    <a:p>
+                      <a:r>
+                        <a:rPr lang="bg-BG" dirty="0" smtClean="0"/>
+                        <a:t>О(</a:t>
+                      </a:r>
+                      <a:r>
+                        <a:rPr lang="en-US" dirty="0" smtClean="0"/>
+                        <a:t>log(N)</a:t>
+                      </a:r>
+                      <a:r>
+                        <a:rPr lang="bg-BG" dirty="0" smtClean="0"/>
+                        <a:t>)</a:t>
+                      </a:r>
+                      <a:endParaRPr lang="en-US" dirty="0"/>
+                    </a:p>
+                  </a:txBody>
+                  <a:tcPr/>
+                </a:tc>
+                <a:tc>
+                  <a:txBody>
+                    <a:bodyPr/>
+                    <a:lstStyle/>
+                    <a:p>
+                      <a:r>
+                        <a:rPr lang="en-US" dirty="0" smtClean="0"/>
+                        <a:t>&lt; 1</a:t>
+                      </a:r>
+                      <a:r>
+                        <a:rPr lang="bg-BG" dirty="0" smtClean="0"/>
+                        <a:t>сек</a:t>
+                      </a:r>
+                      <a:endParaRPr lang="en-US" dirty="0"/>
+                    </a:p>
+                  </a:txBody>
+                  <a:tcPr/>
+                </a:tc>
+                <a:tc>
+                  <a:txBody>
+                    <a:bodyPr/>
+                    <a:lstStyle/>
+                    <a:p>
+                      <a:pPr marL="0" marR="0" indent="0" algn="l" defTabSz="914400" rtl="0" eaLnBrk="1" fontAlgn="auto" latinLnBrk="0" hangingPunct="1">
+                        <a:lnSpc>
+                          <a:spcPct val="100000"/>
+                        </a:lnSpc>
+                        <a:spcBef>
+                          <a:spcPts val="0"/>
+                        </a:spcBef>
+                        <a:spcAft>
+                          <a:spcPts val="0"/>
+                        </a:spcAft>
+                        <a:buClrTx/>
+                        <a:buSzTx/>
+                        <a:buFontTx/>
+                        <a:buNone/>
+                        <a:tabLst/>
+                        <a:defRPr/>
+                      </a:pPr>
+                      <a:r>
+                        <a:rPr lang="en-US" dirty="0" smtClean="0"/>
+                        <a:t>&lt; 1</a:t>
+                      </a:r>
+                      <a:r>
+                        <a:rPr lang="bg-BG" dirty="0" smtClean="0"/>
+                        <a:t>сек</a:t>
+                      </a:r>
+                      <a:endParaRPr lang="en-US" dirty="0" smtClean="0"/>
+                    </a:p>
+                  </a:txBody>
+                  <a:tcPr/>
+                </a:tc>
+                <a:tc>
+                  <a:txBody>
+                    <a:bodyPr/>
+                    <a:lstStyle/>
+                    <a:p>
+                      <a:pPr marL="0" marR="0" indent="0" algn="l" defTabSz="914400" rtl="0" eaLnBrk="1" fontAlgn="auto" latinLnBrk="0" hangingPunct="1">
+                        <a:lnSpc>
+                          <a:spcPct val="100000"/>
+                        </a:lnSpc>
+                        <a:spcBef>
+                          <a:spcPts val="0"/>
+                        </a:spcBef>
+                        <a:spcAft>
+                          <a:spcPts val="0"/>
+                        </a:spcAft>
+                        <a:buClrTx/>
+                        <a:buSzTx/>
+                        <a:buFontTx/>
+                        <a:buNone/>
+                        <a:tabLst/>
+                        <a:defRPr/>
+                      </a:pPr>
+                      <a:r>
+                        <a:rPr lang="en-US" dirty="0" smtClean="0"/>
+                        <a:t>&lt; 1</a:t>
+                      </a:r>
+                      <a:r>
+                        <a:rPr lang="bg-BG" dirty="0" smtClean="0"/>
+                        <a:t>сек</a:t>
+                      </a:r>
+                      <a:endParaRPr lang="en-US" dirty="0" smtClean="0"/>
+                    </a:p>
+                  </a:txBody>
+                  <a:tcPr/>
+                </a:tc>
+                <a:tc>
+                  <a:txBody>
+                    <a:bodyPr/>
+                    <a:lstStyle/>
+                    <a:p>
+                      <a:pPr marL="0" marR="0" indent="0" algn="l" defTabSz="914400" rtl="0" eaLnBrk="1" fontAlgn="auto" latinLnBrk="0" hangingPunct="1">
+                        <a:lnSpc>
+                          <a:spcPct val="100000"/>
+                        </a:lnSpc>
+                        <a:spcBef>
+                          <a:spcPts val="0"/>
+                        </a:spcBef>
+                        <a:spcAft>
+                          <a:spcPts val="0"/>
+                        </a:spcAft>
+                        <a:buClrTx/>
+                        <a:buSzTx/>
+                        <a:buFontTx/>
+                        <a:buNone/>
+                        <a:tabLst/>
+                        <a:defRPr/>
+                      </a:pPr>
+                      <a:r>
+                        <a:rPr lang="en-US" dirty="0" smtClean="0"/>
+                        <a:t>&lt; 1</a:t>
+                      </a:r>
+                      <a:r>
+                        <a:rPr lang="bg-BG" dirty="0" smtClean="0"/>
+                        <a:t>сек</a:t>
+                      </a:r>
+                      <a:endParaRPr lang="en-US" dirty="0" smtClean="0"/>
+                    </a:p>
+                  </a:txBody>
+                  <a:tcPr/>
+                </a:tc>
+                <a:tc>
+                  <a:txBody>
+                    <a:bodyPr/>
+                    <a:lstStyle/>
+                    <a:p>
+                      <a:pPr marL="0" marR="0" indent="0" algn="l" defTabSz="914400" rtl="0" eaLnBrk="1" fontAlgn="auto" latinLnBrk="0" hangingPunct="1">
+                        <a:lnSpc>
+                          <a:spcPct val="100000"/>
+                        </a:lnSpc>
+                        <a:spcBef>
+                          <a:spcPts val="0"/>
+                        </a:spcBef>
+                        <a:spcAft>
+                          <a:spcPts val="0"/>
+                        </a:spcAft>
+                        <a:buClrTx/>
+                        <a:buSzTx/>
+                        <a:buFontTx/>
+                        <a:buNone/>
+                        <a:tabLst/>
+                        <a:defRPr/>
+                      </a:pPr>
+                      <a:r>
+                        <a:rPr lang="en-US" dirty="0" smtClean="0"/>
+                        <a:t>&lt; 1</a:t>
+                      </a:r>
+                      <a:r>
+                        <a:rPr lang="bg-BG" dirty="0" smtClean="0"/>
+                        <a:t>сек</a:t>
+                      </a:r>
+                      <a:endParaRPr lang="en-US" dirty="0" smtClean="0"/>
+                    </a:p>
+                  </a:txBody>
+                  <a:tcPr/>
+                </a:tc>
+                <a:tc>
+                  <a:txBody>
+                    <a:bodyPr/>
+                    <a:lstStyle/>
+                    <a:p>
+                      <a:pPr marL="0" marR="0" indent="0" algn="l" defTabSz="914400" rtl="0" eaLnBrk="1" fontAlgn="auto" latinLnBrk="0" hangingPunct="1">
+                        <a:lnSpc>
+                          <a:spcPct val="100000"/>
+                        </a:lnSpc>
+                        <a:spcBef>
+                          <a:spcPts val="0"/>
+                        </a:spcBef>
+                        <a:spcAft>
+                          <a:spcPts val="0"/>
+                        </a:spcAft>
+                        <a:buClrTx/>
+                        <a:buSzTx/>
+                        <a:buFontTx/>
+                        <a:buNone/>
+                        <a:tabLst/>
+                        <a:defRPr/>
+                      </a:pPr>
+                      <a:r>
+                        <a:rPr lang="en-US" dirty="0" smtClean="0"/>
+                        <a:t>&lt; 1</a:t>
+                      </a:r>
+                      <a:r>
+                        <a:rPr lang="bg-BG" dirty="0" smtClean="0"/>
+                        <a:t>сек</a:t>
+                      </a:r>
+                      <a:endParaRPr lang="en-US" dirty="0" smtClean="0"/>
+                    </a:p>
+                  </a:txBody>
+                  <a:tcPr/>
+                </a:tc>
+                <a:tc>
+                  <a:txBody>
+                    <a:bodyPr/>
+                    <a:lstStyle/>
+                    <a:p>
+                      <a:pPr marL="0" marR="0" indent="0" algn="l" defTabSz="914400" rtl="0" eaLnBrk="1" fontAlgn="auto" latinLnBrk="0" hangingPunct="1">
+                        <a:lnSpc>
+                          <a:spcPct val="100000"/>
+                        </a:lnSpc>
+                        <a:spcBef>
+                          <a:spcPts val="0"/>
+                        </a:spcBef>
+                        <a:spcAft>
+                          <a:spcPts val="0"/>
+                        </a:spcAft>
+                        <a:buClrTx/>
+                        <a:buSzTx/>
+                        <a:buFontTx/>
+                        <a:buNone/>
+                        <a:tabLst/>
+                        <a:defRPr/>
+                      </a:pPr>
+                      <a:r>
+                        <a:rPr lang="en-US" dirty="0" smtClean="0"/>
+                        <a:t>&lt; 1</a:t>
+                      </a:r>
+                      <a:r>
+                        <a:rPr lang="bg-BG" dirty="0" smtClean="0"/>
+                        <a:t>сек</a:t>
+                      </a:r>
+                      <a:endParaRPr lang="en-US" dirty="0" smtClean="0"/>
+                    </a:p>
+                  </a:txBody>
+                  <a:tcPr/>
+                </a:tc>
+              </a:tr>
+              <a:tr h="487720">
+                <a:tc>
+                  <a:txBody>
+                    <a:bodyPr/>
+                    <a:lstStyle/>
+                    <a:p>
+                      <a:r>
+                        <a:rPr lang="en-US" dirty="0" smtClean="0"/>
+                        <a:t>O(N)</a:t>
+                      </a:r>
+                      <a:endParaRPr lang="en-US" dirty="0"/>
+                    </a:p>
+                  </a:txBody>
+                  <a:tcPr/>
+                </a:tc>
+                <a:tc>
+                  <a:txBody>
+                    <a:bodyPr/>
+                    <a:lstStyle/>
+                    <a:p>
+                      <a:r>
+                        <a:rPr lang="en-US" dirty="0" smtClean="0"/>
+                        <a:t>&lt; 1</a:t>
+                      </a:r>
+                      <a:r>
+                        <a:rPr lang="bg-BG" dirty="0" smtClean="0"/>
+                        <a:t>сек</a:t>
+                      </a:r>
+                      <a:endParaRPr lang="en-US" dirty="0"/>
+                    </a:p>
+                  </a:txBody>
+                  <a:tcPr/>
+                </a:tc>
+                <a:tc>
+                  <a:txBody>
+                    <a:bodyPr/>
+                    <a:lstStyle/>
+                    <a:p>
+                      <a:pPr marL="0" marR="0" indent="0" algn="l" defTabSz="914400" rtl="0" eaLnBrk="1" fontAlgn="auto" latinLnBrk="0" hangingPunct="1">
+                        <a:lnSpc>
+                          <a:spcPct val="100000"/>
+                        </a:lnSpc>
+                        <a:spcBef>
+                          <a:spcPts val="0"/>
+                        </a:spcBef>
+                        <a:spcAft>
+                          <a:spcPts val="0"/>
+                        </a:spcAft>
+                        <a:buClrTx/>
+                        <a:buSzTx/>
+                        <a:buFontTx/>
+                        <a:buNone/>
+                        <a:tabLst/>
+                        <a:defRPr/>
+                      </a:pPr>
+                      <a:r>
+                        <a:rPr lang="en-US" dirty="0" smtClean="0"/>
+                        <a:t>&lt; 1</a:t>
+                      </a:r>
+                      <a:r>
+                        <a:rPr lang="bg-BG" dirty="0" smtClean="0"/>
+                        <a:t>сек</a:t>
+                      </a:r>
+                      <a:endParaRPr lang="en-US" dirty="0" smtClean="0"/>
+                    </a:p>
+                  </a:txBody>
+                  <a:tcPr/>
+                </a:tc>
+                <a:tc>
+                  <a:txBody>
+                    <a:bodyPr/>
+                    <a:lstStyle/>
+                    <a:p>
+                      <a:pPr marL="0" marR="0" indent="0" algn="l" defTabSz="914400" rtl="0" eaLnBrk="1" fontAlgn="auto" latinLnBrk="0" hangingPunct="1">
+                        <a:lnSpc>
+                          <a:spcPct val="100000"/>
+                        </a:lnSpc>
+                        <a:spcBef>
+                          <a:spcPts val="0"/>
+                        </a:spcBef>
+                        <a:spcAft>
+                          <a:spcPts val="0"/>
+                        </a:spcAft>
+                        <a:buClrTx/>
+                        <a:buSzTx/>
+                        <a:buFontTx/>
+                        <a:buNone/>
+                        <a:tabLst/>
+                        <a:defRPr/>
+                      </a:pPr>
+                      <a:r>
+                        <a:rPr lang="en-US" dirty="0" smtClean="0"/>
+                        <a:t>&lt; 1</a:t>
+                      </a:r>
+                      <a:r>
+                        <a:rPr lang="bg-BG" dirty="0" smtClean="0"/>
+                        <a:t>сек</a:t>
+                      </a:r>
+                      <a:endParaRPr lang="en-US" dirty="0" smtClean="0"/>
+                    </a:p>
+                  </a:txBody>
+                  <a:tcPr/>
+                </a:tc>
+                <a:tc>
+                  <a:txBody>
+                    <a:bodyPr/>
+                    <a:lstStyle/>
+                    <a:p>
+                      <a:pPr marL="0" marR="0" indent="0" algn="l" defTabSz="914400" rtl="0" eaLnBrk="1" fontAlgn="auto" latinLnBrk="0" hangingPunct="1">
+                        <a:lnSpc>
+                          <a:spcPct val="100000"/>
+                        </a:lnSpc>
+                        <a:spcBef>
+                          <a:spcPts val="0"/>
+                        </a:spcBef>
+                        <a:spcAft>
+                          <a:spcPts val="0"/>
+                        </a:spcAft>
+                        <a:buClrTx/>
+                        <a:buSzTx/>
+                        <a:buFontTx/>
+                        <a:buNone/>
+                        <a:tabLst/>
+                        <a:defRPr/>
+                      </a:pPr>
+                      <a:r>
+                        <a:rPr lang="en-US" dirty="0" smtClean="0"/>
+                        <a:t>&lt; 1</a:t>
+                      </a:r>
+                      <a:r>
+                        <a:rPr lang="bg-BG" dirty="0" smtClean="0"/>
+                        <a:t>сек</a:t>
+                      </a:r>
+                      <a:endParaRPr lang="en-US" dirty="0" smtClean="0"/>
+                    </a:p>
+                  </a:txBody>
+                  <a:tcPr/>
+                </a:tc>
+                <a:tc>
+                  <a:txBody>
+                    <a:bodyPr/>
+                    <a:lstStyle/>
+                    <a:p>
+                      <a:pPr marL="0" marR="0" indent="0" algn="l" defTabSz="914400" rtl="0" eaLnBrk="1" fontAlgn="auto" latinLnBrk="0" hangingPunct="1">
+                        <a:lnSpc>
+                          <a:spcPct val="100000"/>
+                        </a:lnSpc>
+                        <a:spcBef>
+                          <a:spcPts val="0"/>
+                        </a:spcBef>
+                        <a:spcAft>
+                          <a:spcPts val="0"/>
+                        </a:spcAft>
+                        <a:buClrTx/>
+                        <a:buSzTx/>
+                        <a:buFontTx/>
+                        <a:buNone/>
+                        <a:tabLst/>
+                        <a:defRPr/>
+                      </a:pPr>
+                      <a:r>
+                        <a:rPr lang="en-US" dirty="0" smtClean="0"/>
+                        <a:t>&lt; 1</a:t>
+                      </a:r>
+                      <a:r>
+                        <a:rPr lang="bg-BG" dirty="0" smtClean="0"/>
+                        <a:t>сек</a:t>
+                      </a:r>
+                      <a:endParaRPr lang="en-US" dirty="0" smtClean="0"/>
+                    </a:p>
+                  </a:txBody>
+                  <a:tcPr/>
+                </a:tc>
+                <a:tc>
+                  <a:txBody>
+                    <a:bodyPr/>
+                    <a:lstStyle/>
+                    <a:p>
+                      <a:pPr marL="0" marR="0" indent="0" algn="l" defTabSz="914400" rtl="0" eaLnBrk="1" fontAlgn="auto" latinLnBrk="0" hangingPunct="1">
+                        <a:lnSpc>
+                          <a:spcPct val="100000"/>
+                        </a:lnSpc>
+                        <a:spcBef>
+                          <a:spcPts val="0"/>
+                        </a:spcBef>
+                        <a:spcAft>
+                          <a:spcPts val="0"/>
+                        </a:spcAft>
+                        <a:buClrTx/>
+                        <a:buSzTx/>
+                        <a:buFontTx/>
+                        <a:buNone/>
+                        <a:tabLst/>
+                        <a:defRPr/>
+                      </a:pPr>
+                      <a:r>
+                        <a:rPr lang="en-US" dirty="0" smtClean="0"/>
+                        <a:t>&lt; 1</a:t>
+                      </a:r>
+                      <a:r>
+                        <a:rPr lang="bg-BG" dirty="0" smtClean="0"/>
+                        <a:t>сек</a:t>
+                      </a:r>
+                      <a:endParaRPr lang="en-US" dirty="0" smtClean="0"/>
+                    </a:p>
+                  </a:txBody>
+                  <a:tcPr/>
+                </a:tc>
+                <a:tc>
+                  <a:txBody>
+                    <a:bodyPr/>
+                    <a:lstStyle/>
+                    <a:p>
+                      <a:pPr marL="0" marR="0" indent="0" algn="l" defTabSz="914400" rtl="0" eaLnBrk="1" fontAlgn="auto" latinLnBrk="0" hangingPunct="1">
+                        <a:lnSpc>
+                          <a:spcPct val="100000"/>
+                        </a:lnSpc>
+                        <a:spcBef>
+                          <a:spcPts val="0"/>
+                        </a:spcBef>
+                        <a:spcAft>
+                          <a:spcPts val="0"/>
+                        </a:spcAft>
+                        <a:buClrTx/>
+                        <a:buSzTx/>
+                        <a:buFontTx/>
+                        <a:buNone/>
+                        <a:tabLst/>
+                        <a:defRPr/>
+                      </a:pPr>
+                      <a:r>
+                        <a:rPr lang="en-US" dirty="0" smtClean="0"/>
+                        <a:t>&lt; 1</a:t>
+                      </a:r>
+                      <a:r>
+                        <a:rPr lang="bg-BG" dirty="0" smtClean="0"/>
+                        <a:t>сек</a:t>
+                      </a:r>
+                      <a:endParaRPr lang="en-US" dirty="0" smtClean="0"/>
+                    </a:p>
+                  </a:txBody>
+                  <a:tcPr/>
+                </a:tc>
+              </a:tr>
+              <a:tr h="487720">
+                <a:tc>
+                  <a:txBody>
+                    <a:bodyPr/>
+                    <a:lstStyle/>
+                    <a:p>
+                      <a:r>
+                        <a:rPr lang="en-US" dirty="0" smtClean="0"/>
+                        <a:t>O(N^2)</a:t>
+                      </a:r>
+                      <a:endParaRPr lang="en-US" dirty="0"/>
+                    </a:p>
+                  </a:txBody>
+                  <a:tcPr/>
+                </a:tc>
+                <a:tc>
+                  <a:txBody>
+                    <a:bodyPr/>
+                    <a:lstStyle/>
+                    <a:p>
+                      <a:r>
+                        <a:rPr lang="en-US" dirty="0" smtClean="0"/>
+                        <a:t>&lt; 1</a:t>
+                      </a:r>
+                      <a:r>
+                        <a:rPr lang="bg-BG" dirty="0" smtClean="0"/>
+                        <a:t>сек</a:t>
+                      </a:r>
+                      <a:endParaRPr lang="en-US" dirty="0"/>
+                    </a:p>
+                  </a:txBody>
+                  <a:tcPr/>
+                </a:tc>
+                <a:tc>
+                  <a:txBody>
+                    <a:bodyPr/>
+                    <a:lstStyle/>
+                    <a:p>
+                      <a:pPr marL="0" marR="0" indent="0" algn="l" defTabSz="914400" rtl="0" eaLnBrk="1" fontAlgn="auto" latinLnBrk="0" hangingPunct="1">
+                        <a:lnSpc>
+                          <a:spcPct val="100000"/>
+                        </a:lnSpc>
+                        <a:spcBef>
+                          <a:spcPts val="0"/>
+                        </a:spcBef>
+                        <a:spcAft>
+                          <a:spcPts val="0"/>
+                        </a:spcAft>
+                        <a:buClrTx/>
+                        <a:buSzTx/>
+                        <a:buFontTx/>
+                        <a:buNone/>
+                        <a:tabLst/>
+                        <a:defRPr/>
+                      </a:pPr>
+                      <a:r>
+                        <a:rPr lang="en-US" dirty="0" smtClean="0"/>
+                        <a:t>&lt; 1</a:t>
+                      </a:r>
+                      <a:r>
+                        <a:rPr lang="bg-BG" dirty="0" smtClean="0"/>
+                        <a:t>сек</a:t>
+                      </a:r>
+                      <a:endParaRPr lang="en-US" dirty="0" smtClean="0"/>
+                    </a:p>
+                  </a:txBody>
+                  <a:tcPr/>
+                </a:tc>
+                <a:tc>
+                  <a:txBody>
+                    <a:bodyPr/>
+                    <a:lstStyle/>
+                    <a:p>
+                      <a:pPr marL="0" marR="0" indent="0" algn="l" defTabSz="914400" rtl="0" eaLnBrk="1" fontAlgn="auto" latinLnBrk="0" hangingPunct="1">
+                        <a:lnSpc>
+                          <a:spcPct val="100000"/>
+                        </a:lnSpc>
+                        <a:spcBef>
+                          <a:spcPts val="0"/>
+                        </a:spcBef>
+                        <a:spcAft>
+                          <a:spcPts val="0"/>
+                        </a:spcAft>
+                        <a:buClrTx/>
+                        <a:buSzTx/>
+                        <a:buFontTx/>
+                        <a:buNone/>
+                        <a:tabLst/>
+                        <a:defRPr/>
+                      </a:pPr>
+                      <a:r>
+                        <a:rPr lang="en-US" dirty="0" smtClean="0"/>
+                        <a:t>&lt; 1</a:t>
+                      </a:r>
+                      <a:r>
+                        <a:rPr lang="bg-BG" dirty="0" smtClean="0"/>
+                        <a:t>сек</a:t>
+                      </a:r>
+                      <a:endParaRPr lang="en-US" dirty="0" smtClean="0"/>
+                    </a:p>
+                  </a:txBody>
+                  <a:tcPr/>
+                </a:tc>
+                <a:tc>
+                  <a:txBody>
+                    <a:bodyPr/>
+                    <a:lstStyle/>
+                    <a:p>
+                      <a:pPr marL="0" marR="0" indent="0" algn="l" defTabSz="914400" rtl="0" eaLnBrk="1" fontAlgn="auto" latinLnBrk="0" hangingPunct="1">
+                        <a:lnSpc>
+                          <a:spcPct val="100000"/>
+                        </a:lnSpc>
+                        <a:spcBef>
+                          <a:spcPts val="0"/>
+                        </a:spcBef>
+                        <a:spcAft>
+                          <a:spcPts val="0"/>
+                        </a:spcAft>
+                        <a:buClrTx/>
+                        <a:buSzTx/>
+                        <a:buFontTx/>
+                        <a:buNone/>
+                        <a:tabLst/>
+                        <a:defRPr/>
+                      </a:pPr>
+                      <a:r>
+                        <a:rPr lang="en-US" dirty="0" smtClean="0"/>
+                        <a:t>&lt; 1</a:t>
+                      </a:r>
+                      <a:r>
+                        <a:rPr lang="bg-BG" dirty="0" smtClean="0"/>
+                        <a:t>сек</a:t>
+                      </a:r>
+                      <a:endParaRPr lang="en-US" dirty="0" smtClean="0"/>
+                    </a:p>
+                  </a:txBody>
+                  <a:tcPr/>
+                </a:tc>
+                <a:tc>
+                  <a:txBody>
+                    <a:bodyPr/>
+                    <a:lstStyle/>
+                    <a:p>
+                      <a:pPr marL="0" marR="0" indent="0" algn="l" defTabSz="914400" rtl="0" eaLnBrk="1" fontAlgn="auto" latinLnBrk="0" hangingPunct="1">
+                        <a:lnSpc>
+                          <a:spcPct val="100000"/>
+                        </a:lnSpc>
+                        <a:spcBef>
+                          <a:spcPts val="0"/>
+                        </a:spcBef>
+                        <a:spcAft>
+                          <a:spcPts val="0"/>
+                        </a:spcAft>
+                        <a:buClrTx/>
+                        <a:buSzTx/>
+                        <a:buFontTx/>
+                        <a:buNone/>
+                        <a:tabLst/>
+                        <a:defRPr/>
+                      </a:pPr>
+                      <a:r>
+                        <a:rPr lang="en-US" dirty="0" smtClean="0"/>
+                        <a:t>&lt; 1</a:t>
+                      </a:r>
+                      <a:r>
+                        <a:rPr lang="bg-BG" dirty="0" smtClean="0"/>
+                        <a:t>сек</a:t>
+                      </a:r>
+                      <a:endParaRPr lang="en-US" dirty="0" smtClean="0"/>
+                    </a:p>
+                  </a:txBody>
+                  <a:tcPr/>
+                </a:tc>
+                <a:tc>
+                  <a:txBody>
+                    <a:bodyPr/>
+                    <a:lstStyle/>
+                    <a:p>
+                      <a:pPr marL="0" marR="0" indent="0" algn="l" defTabSz="914400" rtl="0" eaLnBrk="1" fontAlgn="auto" latinLnBrk="0" hangingPunct="1">
+                        <a:lnSpc>
+                          <a:spcPct val="100000"/>
+                        </a:lnSpc>
+                        <a:spcBef>
+                          <a:spcPts val="0"/>
+                        </a:spcBef>
+                        <a:spcAft>
+                          <a:spcPts val="0"/>
+                        </a:spcAft>
+                        <a:buClrTx/>
+                        <a:buSzTx/>
+                        <a:buFontTx/>
+                        <a:buNone/>
+                        <a:tabLst/>
+                        <a:defRPr/>
+                      </a:pPr>
+                      <a:r>
+                        <a:rPr lang="en-US" dirty="0" smtClean="0"/>
+                        <a:t>&lt; 1</a:t>
+                      </a:r>
+                      <a:r>
+                        <a:rPr lang="bg-BG" dirty="0" smtClean="0"/>
+                        <a:t>сек</a:t>
+                      </a:r>
+                      <a:endParaRPr lang="en-US" dirty="0" smtClean="0"/>
+                    </a:p>
+                  </a:txBody>
+                  <a:tcPr/>
+                </a:tc>
+                <a:tc>
+                  <a:txBody>
+                    <a:bodyPr/>
+                    <a:lstStyle/>
+                    <a:p>
+                      <a:pPr marL="0" marR="0" indent="0" algn="l" defTabSz="914400" rtl="0" eaLnBrk="1" fontAlgn="auto" latinLnBrk="0" hangingPunct="1">
+                        <a:lnSpc>
+                          <a:spcPct val="100000"/>
+                        </a:lnSpc>
+                        <a:spcBef>
+                          <a:spcPts val="0"/>
+                        </a:spcBef>
+                        <a:spcAft>
+                          <a:spcPts val="0"/>
+                        </a:spcAft>
+                        <a:buClrTx/>
+                        <a:buSzTx/>
+                        <a:buFontTx/>
+                        <a:buNone/>
+                        <a:tabLst/>
+                        <a:defRPr/>
+                      </a:pPr>
+                      <a:r>
+                        <a:rPr lang="bg-BG" dirty="0" smtClean="0"/>
+                        <a:t>3</a:t>
+                      </a:r>
+                      <a:r>
+                        <a:rPr lang="bg-BG" baseline="0" dirty="0" smtClean="0"/>
+                        <a:t> – 4 мин</a:t>
+                      </a:r>
+                      <a:endParaRPr lang="en-US" dirty="0" smtClean="0"/>
+                    </a:p>
+                  </a:txBody>
+                  <a:tcPr/>
+                </a:tc>
+              </a:tr>
+              <a:tr h="487720">
+                <a:tc>
+                  <a:txBody>
+                    <a:bodyPr/>
+                    <a:lstStyle/>
+                    <a:p>
+                      <a:pPr marL="0" marR="0" indent="0" algn="l" defTabSz="914400" rtl="0" eaLnBrk="1" fontAlgn="auto" latinLnBrk="0" hangingPunct="1">
+                        <a:lnSpc>
+                          <a:spcPct val="100000"/>
+                        </a:lnSpc>
+                        <a:spcBef>
+                          <a:spcPts val="0"/>
+                        </a:spcBef>
+                        <a:spcAft>
+                          <a:spcPts val="0"/>
+                        </a:spcAft>
+                        <a:buClrTx/>
+                        <a:buSzTx/>
+                        <a:buFontTx/>
+                        <a:buNone/>
+                        <a:tabLst/>
+                        <a:defRPr/>
+                      </a:pPr>
+                      <a:r>
+                        <a:rPr lang="en-US" dirty="0" smtClean="0"/>
+                        <a:t>O(N^3)</a:t>
+                      </a:r>
+                    </a:p>
+                    <a:p>
+                      <a:endParaRPr lang="en-US" dirty="0"/>
+                    </a:p>
+                  </a:txBody>
+                  <a:tcPr/>
+                </a:tc>
+                <a:tc>
+                  <a:txBody>
+                    <a:bodyPr/>
+                    <a:lstStyle/>
+                    <a:p>
+                      <a:r>
+                        <a:rPr lang="en-US" dirty="0" smtClean="0"/>
+                        <a:t>&lt; 1</a:t>
+                      </a:r>
+                      <a:r>
+                        <a:rPr lang="bg-BG" dirty="0" smtClean="0"/>
+                        <a:t>сек</a:t>
+                      </a:r>
+                      <a:endParaRPr lang="en-US" dirty="0"/>
+                    </a:p>
+                  </a:txBody>
+                  <a:tcPr/>
+                </a:tc>
+                <a:tc>
+                  <a:txBody>
+                    <a:bodyPr/>
+                    <a:lstStyle/>
+                    <a:p>
+                      <a:pPr marL="0" marR="0" indent="0" algn="l" defTabSz="914400" rtl="0" eaLnBrk="1" fontAlgn="auto" latinLnBrk="0" hangingPunct="1">
+                        <a:lnSpc>
+                          <a:spcPct val="100000"/>
+                        </a:lnSpc>
+                        <a:spcBef>
+                          <a:spcPts val="0"/>
+                        </a:spcBef>
+                        <a:spcAft>
+                          <a:spcPts val="0"/>
+                        </a:spcAft>
+                        <a:buClrTx/>
+                        <a:buSzTx/>
+                        <a:buFontTx/>
+                        <a:buNone/>
+                        <a:tabLst/>
+                        <a:defRPr/>
+                      </a:pPr>
+                      <a:r>
+                        <a:rPr lang="en-US" dirty="0" smtClean="0"/>
+                        <a:t>&lt; 1</a:t>
+                      </a:r>
+                      <a:r>
+                        <a:rPr lang="bg-BG" dirty="0" smtClean="0"/>
+                        <a:t>сек</a:t>
+                      </a:r>
+                      <a:endParaRPr lang="en-US" dirty="0" smtClean="0"/>
+                    </a:p>
+                  </a:txBody>
+                  <a:tcPr/>
+                </a:tc>
+                <a:tc>
+                  <a:txBody>
+                    <a:bodyPr/>
+                    <a:lstStyle/>
+                    <a:p>
+                      <a:pPr marL="0" marR="0" indent="0" algn="l" defTabSz="914400" rtl="0" eaLnBrk="1" fontAlgn="auto" latinLnBrk="0" hangingPunct="1">
+                        <a:lnSpc>
+                          <a:spcPct val="100000"/>
+                        </a:lnSpc>
+                        <a:spcBef>
+                          <a:spcPts val="0"/>
+                        </a:spcBef>
+                        <a:spcAft>
+                          <a:spcPts val="0"/>
+                        </a:spcAft>
+                        <a:buClrTx/>
+                        <a:buSzTx/>
+                        <a:buFontTx/>
+                        <a:buNone/>
+                        <a:tabLst/>
+                        <a:defRPr/>
+                      </a:pPr>
+                      <a:r>
+                        <a:rPr lang="en-US" dirty="0" smtClean="0"/>
+                        <a:t>&lt; 1</a:t>
+                      </a:r>
+                      <a:r>
+                        <a:rPr lang="bg-BG" dirty="0" smtClean="0"/>
+                        <a:t>сек</a:t>
+                      </a:r>
+                      <a:endParaRPr lang="en-US" dirty="0" smtClean="0"/>
+                    </a:p>
+                  </a:txBody>
+                  <a:tcPr/>
+                </a:tc>
+                <a:tc>
+                  <a:txBody>
+                    <a:bodyPr/>
+                    <a:lstStyle/>
+                    <a:p>
+                      <a:pPr marL="0" marR="0" indent="0" algn="l" defTabSz="914400" rtl="0" eaLnBrk="1" fontAlgn="auto" latinLnBrk="0" hangingPunct="1">
+                        <a:lnSpc>
+                          <a:spcPct val="100000"/>
+                        </a:lnSpc>
+                        <a:spcBef>
+                          <a:spcPts val="0"/>
+                        </a:spcBef>
+                        <a:spcAft>
+                          <a:spcPts val="0"/>
+                        </a:spcAft>
+                        <a:buClrTx/>
+                        <a:buSzTx/>
+                        <a:buFontTx/>
+                        <a:buNone/>
+                        <a:tabLst/>
+                        <a:defRPr/>
+                      </a:pPr>
+                      <a:r>
+                        <a:rPr lang="en-US" dirty="0" smtClean="0"/>
+                        <a:t>&lt; 1</a:t>
+                      </a:r>
+                      <a:r>
+                        <a:rPr lang="bg-BG" dirty="0" smtClean="0"/>
+                        <a:t>сек</a:t>
+                      </a:r>
+                      <a:endParaRPr lang="en-US" dirty="0" smtClean="0"/>
+                    </a:p>
+                  </a:txBody>
+                  <a:tcPr/>
+                </a:tc>
+                <a:tc>
+                  <a:txBody>
+                    <a:bodyPr/>
+                    <a:lstStyle/>
+                    <a:p>
+                      <a:r>
+                        <a:rPr lang="bg-BG" dirty="0" smtClean="0"/>
+                        <a:t>20 сек</a:t>
+                      </a:r>
+                      <a:endParaRPr lang="en-US" dirty="0"/>
+                    </a:p>
+                  </a:txBody>
+                  <a:tcPr/>
+                </a:tc>
+                <a:tc>
+                  <a:txBody>
+                    <a:bodyPr/>
+                    <a:lstStyle/>
+                    <a:p>
+                      <a:r>
+                        <a:rPr lang="bg-BG" dirty="0" smtClean="0"/>
+                        <a:t>5 часа</a:t>
+                      </a:r>
+                      <a:endParaRPr lang="en-US" dirty="0"/>
+                    </a:p>
+                  </a:txBody>
+                  <a:tcPr/>
+                </a:tc>
+                <a:tc>
+                  <a:txBody>
+                    <a:bodyPr/>
+                    <a:lstStyle/>
+                    <a:p>
+                      <a:r>
+                        <a:rPr lang="bg-BG" dirty="0" smtClean="0"/>
+                        <a:t>240</a:t>
+                      </a:r>
+                      <a:r>
+                        <a:rPr lang="bg-BG" baseline="0" dirty="0" smtClean="0"/>
+                        <a:t> дни</a:t>
+                      </a:r>
+                      <a:endParaRPr lang="en-US" dirty="0"/>
+                    </a:p>
+                  </a:txBody>
+                  <a:tcPr/>
+                </a:tc>
+              </a:tr>
+              <a:tr h="487720">
+                <a:tc>
+                  <a:txBody>
+                    <a:bodyPr/>
+                    <a:lstStyle/>
+                    <a:p>
+                      <a:pPr marL="0" marR="0" indent="0" algn="l" defTabSz="914400" rtl="0" eaLnBrk="1" fontAlgn="auto" latinLnBrk="0" hangingPunct="1">
+                        <a:lnSpc>
+                          <a:spcPct val="100000"/>
+                        </a:lnSpc>
+                        <a:spcBef>
+                          <a:spcPts val="0"/>
+                        </a:spcBef>
+                        <a:spcAft>
+                          <a:spcPts val="0"/>
+                        </a:spcAft>
+                        <a:buClrTx/>
+                        <a:buSzTx/>
+                        <a:buFontTx/>
+                        <a:buNone/>
+                        <a:tabLst/>
+                        <a:defRPr/>
+                      </a:pPr>
+                      <a:r>
+                        <a:rPr lang="en-US" dirty="0" smtClean="0"/>
+                        <a:t>O(2^N)</a:t>
+                      </a:r>
+                    </a:p>
+                    <a:p>
+                      <a:endParaRPr lang="en-US" dirty="0"/>
+                    </a:p>
+                  </a:txBody>
+                  <a:tcPr/>
+                </a:tc>
+                <a:tc>
+                  <a:txBody>
+                    <a:bodyPr/>
+                    <a:lstStyle/>
+                    <a:p>
+                      <a:r>
+                        <a:rPr lang="en-US" dirty="0" smtClean="0"/>
+                        <a:t>&lt; 1</a:t>
+                      </a:r>
+                      <a:r>
+                        <a:rPr lang="bg-BG" dirty="0" smtClean="0"/>
+                        <a:t>сек</a:t>
+                      </a:r>
+                      <a:endParaRPr lang="en-US" dirty="0"/>
+                    </a:p>
+                  </a:txBody>
+                  <a:tcPr/>
+                </a:tc>
+                <a:tc>
+                  <a:txBody>
+                    <a:bodyPr/>
+                    <a:lstStyle/>
+                    <a:p>
+                      <a:pPr marL="0" marR="0" indent="0" algn="l" defTabSz="914400" rtl="0" eaLnBrk="1" fontAlgn="auto" latinLnBrk="0" hangingPunct="1">
+                        <a:lnSpc>
+                          <a:spcPct val="100000"/>
+                        </a:lnSpc>
+                        <a:spcBef>
+                          <a:spcPts val="0"/>
+                        </a:spcBef>
+                        <a:spcAft>
+                          <a:spcPts val="0"/>
+                        </a:spcAft>
+                        <a:buClrTx/>
+                        <a:buSzTx/>
+                        <a:buFontTx/>
+                        <a:buNone/>
+                        <a:tabLst/>
+                        <a:defRPr/>
+                      </a:pPr>
+                      <a:r>
+                        <a:rPr lang="en-US" dirty="0" smtClean="0"/>
+                        <a:t>&lt; 1</a:t>
+                      </a:r>
+                      <a:r>
+                        <a:rPr lang="bg-BG" dirty="0" smtClean="0"/>
+                        <a:t>сек</a:t>
+                      </a:r>
+                      <a:endParaRPr lang="en-US" dirty="0" smtClean="0"/>
+                    </a:p>
+                  </a:txBody>
+                  <a:tcPr/>
+                </a:tc>
+                <a:tc>
+                  <a:txBody>
+                    <a:bodyPr/>
+                    <a:lstStyle/>
+                    <a:p>
+                      <a:r>
+                        <a:rPr lang="bg-BG" dirty="0" smtClean="0"/>
+                        <a:t>260 дни</a:t>
+                      </a:r>
+                      <a:endParaRPr lang="en-US" dirty="0"/>
+                    </a:p>
+                  </a:txBody>
+                  <a:tcPr/>
+                </a:tc>
+                <a:tc>
+                  <a:txBody>
+                    <a:bodyPr/>
+                    <a:lstStyle/>
+                    <a:p>
+                      <a:r>
+                        <a:rPr lang="bg-BG" dirty="0" smtClean="0"/>
+                        <a:t>никога</a:t>
+                      </a:r>
+                      <a:endParaRPr lang="en-US" dirty="0"/>
+                    </a:p>
+                  </a:txBody>
+                  <a:tcPr/>
+                </a:tc>
+                <a:tc>
+                  <a:txBody>
+                    <a:bodyPr/>
+                    <a:lstStyle/>
+                    <a:p>
+                      <a:pPr marL="0" marR="0" indent="0" algn="l" defTabSz="914400" rtl="0" eaLnBrk="1" fontAlgn="auto" latinLnBrk="0" hangingPunct="1">
+                        <a:lnSpc>
+                          <a:spcPct val="100000"/>
+                        </a:lnSpc>
+                        <a:spcBef>
+                          <a:spcPts val="0"/>
+                        </a:spcBef>
+                        <a:spcAft>
+                          <a:spcPts val="0"/>
+                        </a:spcAft>
+                        <a:buClrTx/>
+                        <a:buSzTx/>
+                        <a:buFontTx/>
+                        <a:buNone/>
+                        <a:tabLst/>
+                        <a:defRPr/>
+                      </a:pPr>
+                      <a:r>
+                        <a:rPr lang="bg-BG" dirty="0" smtClean="0"/>
+                        <a:t>никога</a:t>
+                      </a:r>
+                      <a:endParaRPr lang="en-US" dirty="0" smtClean="0"/>
+                    </a:p>
+                    <a:p>
+                      <a:endParaRPr lang="en-US" dirty="0"/>
+                    </a:p>
+                  </a:txBody>
+                  <a:tcPr/>
+                </a:tc>
+                <a:tc>
+                  <a:txBody>
+                    <a:bodyPr/>
+                    <a:lstStyle/>
+                    <a:p>
+                      <a:pPr marL="0" marR="0" indent="0" algn="l" defTabSz="914400" rtl="0" eaLnBrk="1" fontAlgn="auto" latinLnBrk="0" hangingPunct="1">
+                        <a:lnSpc>
+                          <a:spcPct val="100000"/>
+                        </a:lnSpc>
+                        <a:spcBef>
+                          <a:spcPts val="0"/>
+                        </a:spcBef>
+                        <a:spcAft>
+                          <a:spcPts val="0"/>
+                        </a:spcAft>
+                        <a:buClrTx/>
+                        <a:buSzTx/>
+                        <a:buFontTx/>
+                        <a:buNone/>
+                        <a:tabLst/>
+                        <a:defRPr/>
+                      </a:pPr>
+                      <a:r>
+                        <a:rPr lang="bg-BG" dirty="0" smtClean="0"/>
+                        <a:t>никога</a:t>
+                      </a:r>
+                      <a:endParaRPr lang="en-US" dirty="0" smtClean="0"/>
+                    </a:p>
+                    <a:p>
+                      <a:endParaRPr lang="en-US" dirty="0"/>
+                    </a:p>
+                  </a:txBody>
+                  <a:tcPr/>
+                </a:tc>
+                <a:tc>
+                  <a:txBody>
+                    <a:bodyPr/>
+                    <a:lstStyle/>
+                    <a:p>
+                      <a:pPr marL="0" marR="0" indent="0" algn="l" defTabSz="914400" rtl="0" eaLnBrk="1" fontAlgn="auto" latinLnBrk="0" hangingPunct="1">
+                        <a:lnSpc>
+                          <a:spcPct val="100000"/>
+                        </a:lnSpc>
+                        <a:spcBef>
+                          <a:spcPts val="0"/>
+                        </a:spcBef>
+                        <a:spcAft>
+                          <a:spcPts val="0"/>
+                        </a:spcAft>
+                        <a:buClrTx/>
+                        <a:buSzTx/>
+                        <a:buFontTx/>
+                        <a:buNone/>
+                        <a:tabLst/>
+                        <a:defRPr/>
+                      </a:pPr>
+                      <a:r>
+                        <a:rPr lang="bg-BG" dirty="0" smtClean="0"/>
+                        <a:t>никога</a:t>
+                      </a:r>
+                      <a:endParaRPr lang="en-US" dirty="0" smtClean="0"/>
+                    </a:p>
+                    <a:p>
+                      <a:endParaRPr lang="en-US" dirty="0"/>
+                    </a:p>
+                  </a:txBody>
+                  <a:tcPr/>
+                </a:tc>
+              </a:tr>
+              <a:tr h="487720">
+                <a:tc>
+                  <a:txBody>
+                    <a:bodyPr/>
+                    <a:lstStyle/>
+                    <a:p>
+                      <a:pPr marL="0" marR="0" indent="0" algn="l" defTabSz="914400" rtl="0" eaLnBrk="1" fontAlgn="auto" latinLnBrk="0" hangingPunct="1">
+                        <a:lnSpc>
+                          <a:spcPct val="100000"/>
+                        </a:lnSpc>
+                        <a:spcBef>
+                          <a:spcPts val="0"/>
+                        </a:spcBef>
+                        <a:spcAft>
+                          <a:spcPts val="0"/>
+                        </a:spcAft>
+                        <a:buClrTx/>
+                        <a:buSzTx/>
+                        <a:buFontTx/>
+                        <a:buNone/>
+                        <a:tabLst/>
+                        <a:defRPr/>
+                      </a:pPr>
+                      <a:r>
+                        <a:rPr lang="en-US" dirty="0" smtClean="0"/>
+                        <a:t>O(N!)</a:t>
+                      </a:r>
+                    </a:p>
+                    <a:p>
+                      <a:endParaRPr lang="en-US" dirty="0"/>
+                    </a:p>
+                  </a:txBody>
+                  <a:tcPr/>
+                </a:tc>
+                <a:tc>
+                  <a:txBody>
+                    <a:bodyPr/>
+                    <a:lstStyle/>
+                    <a:p>
+                      <a:pPr marL="0" marR="0" indent="0" algn="l" defTabSz="914400" rtl="0" eaLnBrk="1" fontAlgn="auto" latinLnBrk="0" hangingPunct="1">
+                        <a:lnSpc>
+                          <a:spcPct val="100000"/>
+                        </a:lnSpc>
+                        <a:spcBef>
+                          <a:spcPts val="0"/>
+                        </a:spcBef>
+                        <a:spcAft>
+                          <a:spcPts val="0"/>
+                        </a:spcAft>
+                        <a:buClrTx/>
+                        <a:buSzTx/>
+                        <a:buFontTx/>
+                        <a:buNone/>
+                        <a:tabLst/>
+                        <a:defRPr/>
+                      </a:pPr>
+                      <a:r>
+                        <a:rPr lang="en-US" dirty="0" smtClean="0"/>
+                        <a:t>&lt; 1</a:t>
+                      </a:r>
+                      <a:r>
+                        <a:rPr lang="bg-BG" dirty="0" smtClean="0"/>
+                        <a:t>сек</a:t>
+                      </a:r>
+                      <a:endParaRPr lang="en-US" dirty="0" smtClean="0"/>
+                    </a:p>
+                    <a:p>
+                      <a:endParaRPr lang="en-US" dirty="0"/>
+                    </a:p>
+                  </a:txBody>
+                  <a:tcPr/>
+                </a:tc>
+                <a:tc>
+                  <a:txBody>
+                    <a:bodyPr/>
+                    <a:lstStyle/>
+                    <a:p>
+                      <a:pPr marL="0" marR="0" indent="0" algn="l" defTabSz="914400" rtl="0" eaLnBrk="1" fontAlgn="auto" latinLnBrk="0" hangingPunct="1">
+                        <a:lnSpc>
+                          <a:spcPct val="100000"/>
+                        </a:lnSpc>
+                        <a:spcBef>
+                          <a:spcPts val="0"/>
+                        </a:spcBef>
+                        <a:spcAft>
+                          <a:spcPts val="0"/>
+                        </a:spcAft>
+                        <a:buClrTx/>
+                        <a:buSzTx/>
+                        <a:buFontTx/>
+                        <a:buNone/>
+                        <a:tabLst/>
+                        <a:defRPr/>
+                      </a:pPr>
+                      <a:r>
+                        <a:rPr lang="bg-BG" dirty="0" smtClean="0"/>
+                        <a:t>никога</a:t>
+                      </a:r>
+                      <a:endParaRPr lang="en-US" dirty="0" smtClean="0"/>
+                    </a:p>
+                  </a:txBody>
+                  <a:tcPr/>
+                </a:tc>
+                <a:tc>
+                  <a:txBody>
+                    <a:bodyPr/>
+                    <a:lstStyle/>
+                    <a:p>
+                      <a:pPr marL="0" marR="0" indent="0" algn="l" defTabSz="914400" rtl="0" eaLnBrk="1" fontAlgn="auto" latinLnBrk="0" hangingPunct="1">
+                        <a:lnSpc>
+                          <a:spcPct val="100000"/>
+                        </a:lnSpc>
+                        <a:spcBef>
+                          <a:spcPts val="0"/>
+                        </a:spcBef>
+                        <a:spcAft>
+                          <a:spcPts val="0"/>
+                        </a:spcAft>
+                        <a:buClrTx/>
+                        <a:buSzTx/>
+                        <a:buFontTx/>
+                        <a:buNone/>
+                        <a:tabLst/>
+                        <a:defRPr/>
+                      </a:pPr>
+                      <a:r>
+                        <a:rPr lang="bg-BG" dirty="0" smtClean="0"/>
+                        <a:t>никога</a:t>
+                      </a:r>
+                      <a:endParaRPr lang="en-US" dirty="0" smtClean="0"/>
+                    </a:p>
+                  </a:txBody>
+                  <a:tcPr/>
+                </a:tc>
+                <a:tc>
+                  <a:txBody>
+                    <a:bodyPr/>
+                    <a:lstStyle/>
+                    <a:p>
+                      <a:pPr marL="0" marR="0" indent="0" algn="l" defTabSz="914400" rtl="0" eaLnBrk="1" fontAlgn="auto" latinLnBrk="0" hangingPunct="1">
+                        <a:lnSpc>
+                          <a:spcPct val="100000"/>
+                        </a:lnSpc>
+                        <a:spcBef>
+                          <a:spcPts val="0"/>
+                        </a:spcBef>
+                        <a:spcAft>
+                          <a:spcPts val="0"/>
+                        </a:spcAft>
+                        <a:buClrTx/>
+                        <a:buSzTx/>
+                        <a:buFontTx/>
+                        <a:buNone/>
+                        <a:tabLst/>
+                        <a:defRPr/>
+                      </a:pPr>
+                      <a:r>
+                        <a:rPr lang="bg-BG" dirty="0" smtClean="0"/>
+                        <a:t>никога</a:t>
+                      </a:r>
+                      <a:endParaRPr lang="en-US" dirty="0" smtClean="0"/>
+                    </a:p>
+                  </a:txBody>
+                  <a:tcPr/>
+                </a:tc>
+                <a:tc>
+                  <a:txBody>
+                    <a:bodyPr/>
+                    <a:lstStyle/>
+                    <a:p>
+                      <a:pPr marL="0" marR="0" indent="0" algn="l" defTabSz="914400" rtl="0" eaLnBrk="1" fontAlgn="auto" latinLnBrk="0" hangingPunct="1">
+                        <a:lnSpc>
+                          <a:spcPct val="100000"/>
+                        </a:lnSpc>
+                        <a:spcBef>
+                          <a:spcPts val="0"/>
+                        </a:spcBef>
+                        <a:spcAft>
+                          <a:spcPts val="0"/>
+                        </a:spcAft>
+                        <a:buClrTx/>
+                        <a:buSzTx/>
+                        <a:buFontTx/>
+                        <a:buNone/>
+                        <a:tabLst/>
+                        <a:defRPr/>
+                      </a:pPr>
+                      <a:r>
+                        <a:rPr lang="bg-BG" dirty="0" smtClean="0"/>
+                        <a:t>никога</a:t>
+                      </a:r>
+                      <a:endParaRPr lang="en-US" dirty="0" smtClean="0"/>
+                    </a:p>
+                  </a:txBody>
+                  <a:tcPr/>
+                </a:tc>
+                <a:tc>
+                  <a:txBody>
+                    <a:bodyPr/>
+                    <a:lstStyle/>
+                    <a:p>
+                      <a:pPr marL="0" marR="0" indent="0" algn="l" defTabSz="914400" rtl="0" eaLnBrk="1" fontAlgn="auto" latinLnBrk="0" hangingPunct="1">
+                        <a:lnSpc>
+                          <a:spcPct val="100000"/>
+                        </a:lnSpc>
+                        <a:spcBef>
+                          <a:spcPts val="0"/>
+                        </a:spcBef>
+                        <a:spcAft>
+                          <a:spcPts val="0"/>
+                        </a:spcAft>
+                        <a:buClrTx/>
+                        <a:buSzTx/>
+                        <a:buFontTx/>
+                        <a:buNone/>
+                        <a:tabLst/>
+                        <a:defRPr/>
+                      </a:pPr>
+                      <a:r>
+                        <a:rPr lang="bg-BG" dirty="0" smtClean="0"/>
+                        <a:t>никога</a:t>
+                      </a:r>
+                      <a:endParaRPr lang="en-US" dirty="0" smtClean="0"/>
+                    </a:p>
+                  </a:txBody>
+                  <a:tcPr/>
+                </a:tc>
+                <a:tc>
+                  <a:txBody>
+                    <a:bodyPr/>
+                    <a:lstStyle/>
+                    <a:p>
+                      <a:pPr marL="0" marR="0" indent="0" algn="l" defTabSz="914400" rtl="0" eaLnBrk="1" fontAlgn="auto" latinLnBrk="0" hangingPunct="1">
+                        <a:lnSpc>
+                          <a:spcPct val="100000"/>
+                        </a:lnSpc>
+                        <a:spcBef>
+                          <a:spcPts val="0"/>
+                        </a:spcBef>
+                        <a:spcAft>
+                          <a:spcPts val="0"/>
+                        </a:spcAft>
+                        <a:buClrTx/>
+                        <a:buSzTx/>
+                        <a:buFontTx/>
+                        <a:buNone/>
+                        <a:tabLst/>
+                        <a:defRPr/>
+                      </a:pPr>
+                      <a:r>
+                        <a:rPr lang="bg-BG" dirty="0" smtClean="0"/>
+                        <a:t>никога</a:t>
+                      </a:r>
+                      <a:endParaRPr lang="en-US" dirty="0" smtClean="0"/>
+                    </a:p>
+                  </a:txBody>
+                  <a:tcPr/>
+                </a:tc>
+              </a:tr>
+              <a:tr h="487720">
+                <a:tc>
+                  <a:txBody>
+                    <a:bodyPr/>
+                    <a:lstStyle/>
+                    <a:p>
+                      <a:r>
+                        <a:rPr lang="en-US" dirty="0" smtClean="0"/>
+                        <a:t>O(N^N)</a:t>
+                      </a:r>
+                      <a:endParaRPr lang="en-US" dirty="0"/>
+                    </a:p>
+                  </a:txBody>
+                  <a:tcPr/>
+                </a:tc>
+                <a:tc>
+                  <a:txBody>
+                    <a:bodyPr/>
+                    <a:lstStyle/>
+                    <a:p>
+                      <a:pPr marL="0" marR="0" indent="0" algn="l" defTabSz="914400" rtl="0" eaLnBrk="1" fontAlgn="auto" latinLnBrk="0" hangingPunct="1">
+                        <a:lnSpc>
+                          <a:spcPct val="100000"/>
+                        </a:lnSpc>
+                        <a:spcBef>
+                          <a:spcPts val="0"/>
+                        </a:spcBef>
+                        <a:spcAft>
+                          <a:spcPts val="0"/>
+                        </a:spcAft>
+                        <a:buClrTx/>
+                        <a:buSzTx/>
+                        <a:buFontTx/>
+                        <a:buNone/>
+                        <a:tabLst/>
+                        <a:defRPr/>
+                      </a:pPr>
+                      <a:r>
+                        <a:rPr lang="bg-BG" dirty="0" smtClean="0"/>
+                        <a:t>3</a:t>
+                      </a:r>
+                      <a:r>
+                        <a:rPr lang="bg-BG" baseline="0" dirty="0" smtClean="0"/>
+                        <a:t> – 4 мин</a:t>
+                      </a:r>
+                      <a:endParaRPr lang="en-US" dirty="0" smtClean="0"/>
+                    </a:p>
+                  </a:txBody>
+                  <a:tcPr/>
+                </a:tc>
+                <a:tc>
+                  <a:txBody>
+                    <a:bodyPr/>
+                    <a:lstStyle/>
+                    <a:p>
+                      <a:pPr marL="0" marR="0" indent="0" algn="l" defTabSz="914400" rtl="0" eaLnBrk="1" fontAlgn="auto" latinLnBrk="0" hangingPunct="1">
+                        <a:lnSpc>
+                          <a:spcPct val="100000"/>
+                        </a:lnSpc>
+                        <a:spcBef>
+                          <a:spcPts val="0"/>
+                        </a:spcBef>
+                        <a:spcAft>
+                          <a:spcPts val="0"/>
+                        </a:spcAft>
+                        <a:buClrTx/>
+                        <a:buSzTx/>
+                        <a:buFontTx/>
+                        <a:buNone/>
+                        <a:tabLst/>
+                        <a:defRPr/>
+                      </a:pPr>
+                      <a:r>
+                        <a:rPr lang="bg-BG" dirty="0" smtClean="0"/>
+                        <a:t>никога</a:t>
+                      </a:r>
+                      <a:endParaRPr lang="en-US" dirty="0" smtClean="0"/>
+                    </a:p>
+                  </a:txBody>
+                  <a:tcPr/>
+                </a:tc>
+                <a:tc>
+                  <a:txBody>
+                    <a:bodyPr/>
+                    <a:lstStyle/>
+                    <a:p>
+                      <a:pPr marL="0" marR="0" indent="0" algn="l" defTabSz="914400" rtl="0" eaLnBrk="1" fontAlgn="auto" latinLnBrk="0" hangingPunct="1">
+                        <a:lnSpc>
+                          <a:spcPct val="100000"/>
+                        </a:lnSpc>
+                        <a:spcBef>
+                          <a:spcPts val="0"/>
+                        </a:spcBef>
+                        <a:spcAft>
+                          <a:spcPts val="0"/>
+                        </a:spcAft>
+                        <a:buClrTx/>
+                        <a:buSzTx/>
+                        <a:buFontTx/>
+                        <a:buNone/>
+                        <a:tabLst/>
+                        <a:defRPr/>
+                      </a:pPr>
+                      <a:r>
+                        <a:rPr lang="bg-BG" dirty="0" smtClean="0"/>
+                        <a:t>никога</a:t>
+                      </a:r>
+                      <a:endParaRPr lang="en-US" dirty="0" smtClean="0"/>
+                    </a:p>
+                  </a:txBody>
+                  <a:tcPr/>
+                </a:tc>
+                <a:tc>
+                  <a:txBody>
+                    <a:bodyPr/>
+                    <a:lstStyle/>
+                    <a:p>
+                      <a:pPr marL="0" marR="0" indent="0" algn="l" defTabSz="914400" rtl="0" eaLnBrk="1" fontAlgn="auto" latinLnBrk="0" hangingPunct="1">
+                        <a:lnSpc>
+                          <a:spcPct val="100000"/>
+                        </a:lnSpc>
+                        <a:spcBef>
+                          <a:spcPts val="0"/>
+                        </a:spcBef>
+                        <a:spcAft>
+                          <a:spcPts val="0"/>
+                        </a:spcAft>
+                        <a:buClrTx/>
+                        <a:buSzTx/>
+                        <a:buFontTx/>
+                        <a:buNone/>
+                        <a:tabLst/>
+                        <a:defRPr/>
+                      </a:pPr>
+                      <a:r>
+                        <a:rPr lang="bg-BG" dirty="0" smtClean="0"/>
+                        <a:t>никога</a:t>
+                      </a:r>
+                      <a:endParaRPr lang="en-US" dirty="0" smtClean="0"/>
+                    </a:p>
+                  </a:txBody>
+                  <a:tcPr/>
+                </a:tc>
+                <a:tc>
+                  <a:txBody>
+                    <a:bodyPr/>
+                    <a:lstStyle/>
+                    <a:p>
+                      <a:pPr marL="0" marR="0" indent="0" algn="l" defTabSz="914400" rtl="0" eaLnBrk="1" fontAlgn="auto" latinLnBrk="0" hangingPunct="1">
+                        <a:lnSpc>
+                          <a:spcPct val="100000"/>
+                        </a:lnSpc>
+                        <a:spcBef>
+                          <a:spcPts val="0"/>
+                        </a:spcBef>
+                        <a:spcAft>
+                          <a:spcPts val="0"/>
+                        </a:spcAft>
+                        <a:buClrTx/>
+                        <a:buSzTx/>
+                        <a:buFontTx/>
+                        <a:buNone/>
+                        <a:tabLst/>
+                        <a:defRPr/>
+                      </a:pPr>
+                      <a:r>
+                        <a:rPr lang="bg-BG" dirty="0" smtClean="0"/>
+                        <a:t>никога</a:t>
+                      </a:r>
+                      <a:endParaRPr lang="en-US" dirty="0" smtClean="0"/>
+                    </a:p>
+                  </a:txBody>
+                  <a:tcPr/>
+                </a:tc>
+                <a:tc>
+                  <a:txBody>
+                    <a:bodyPr/>
+                    <a:lstStyle/>
+                    <a:p>
+                      <a:pPr marL="0" marR="0" indent="0" algn="l" defTabSz="914400" rtl="0" eaLnBrk="1" fontAlgn="auto" latinLnBrk="0" hangingPunct="1">
+                        <a:lnSpc>
+                          <a:spcPct val="100000"/>
+                        </a:lnSpc>
+                        <a:spcBef>
+                          <a:spcPts val="0"/>
+                        </a:spcBef>
+                        <a:spcAft>
+                          <a:spcPts val="0"/>
+                        </a:spcAft>
+                        <a:buClrTx/>
+                        <a:buSzTx/>
+                        <a:buFontTx/>
+                        <a:buNone/>
+                        <a:tabLst/>
+                        <a:defRPr/>
+                      </a:pPr>
+                      <a:r>
+                        <a:rPr lang="bg-BG" dirty="0" smtClean="0"/>
+                        <a:t>никога</a:t>
+                      </a:r>
+                      <a:endParaRPr lang="en-US" dirty="0" smtClean="0"/>
+                    </a:p>
+                  </a:txBody>
+                  <a:tcPr/>
+                </a:tc>
+                <a:tc>
+                  <a:txBody>
+                    <a:bodyPr/>
+                    <a:lstStyle/>
+                    <a:p>
+                      <a:pPr marL="0" marR="0" indent="0" algn="l" defTabSz="914400" rtl="0" eaLnBrk="1" fontAlgn="auto" latinLnBrk="0" hangingPunct="1">
+                        <a:lnSpc>
+                          <a:spcPct val="100000"/>
+                        </a:lnSpc>
+                        <a:spcBef>
+                          <a:spcPts val="0"/>
+                        </a:spcBef>
+                        <a:spcAft>
+                          <a:spcPts val="0"/>
+                        </a:spcAft>
+                        <a:buClrTx/>
+                        <a:buSzTx/>
+                        <a:buFontTx/>
+                        <a:buNone/>
+                        <a:tabLst/>
+                        <a:defRPr/>
+                      </a:pPr>
+                      <a:r>
+                        <a:rPr lang="bg-BG" dirty="0" smtClean="0"/>
+                        <a:t>никога</a:t>
+                      </a:r>
+                      <a:endParaRPr lang="en-US" dirty="0" smtClean="0"/>
+                    </a:p>
+                  </a:txBody>
+                  <a:tcPr/>
+                </a:tc>
+              </a:tr>
+            </a:tbl>
+          </a:graphicData>
+        </a:graphic>
+      </p:graphicFrame>
+    </p:spTree>
+    <p:extLst>
+      <p:ext uri="{BB962C8B-B14F-4D97-AF65-F5344CB8AC3E}">
+        <p14:creationId xmlns:p14="http://schemas.microsoft.com/office/powerpoint/2010/main" val="1463499400"/>
+      </p:ext>
+    </p:extLst>
+  </p:cSld>
+  <p:clrMapOvr>
+    <a:masterClrMapping/>
+  </p:clrMapOvr>
+</p:sld>
+</file>
+
+<file path=ppt/slides/slide12.xml><?xml version="1.0" encoding="utf-8"?>
+<p:sld xmlns:a="http://schemas.openxmlformats.org/drawingml/2006/main" xmlns:r="http://schemas.openxmlformats.org/officeDocument/2006/relationships" xmlns:p="http://schemas.openxmlformats.org/presentationml/2006/main">
+  <p:cSld>
+    <p:spTree>
+      <p:nvGrpSpPr>
+        <p:cNvPr id="1" name=""/>
+        <p:cNvGrpSpPr/>
+        <p:nvPr/>
+      </p:nvGrpSpPr>
+      <p:grpSpPr>
+        <a:xfrm>
+          <a:off x="0" y="0"/>
+          <a:ext cx="0" cy="0"/>
+          <a:chOff x="0" y="0"/>
+          <a:chExt cx="0" cy="0"/>
+        </a:xfrm>
+      </p:grpSpPr>
+      <p:sp>
+        <p:nvSpPr>
+          <p:cNvPr id="2" name="Title 1"/>
+          <p:cNvSpPr>
+            <a:spLocks noGrp="1"/>
+          </p:cNvSpPr>
+          <p:nvPr>
+            <p:ph type="title"/>
+          </p:nvPr>
+        </p:nvSpPr>
+        <p:spPr/>
+        <p:txBody>
+          <a:bodyPr/>
+          <a:lstStyle/>
+          <a:p>
+            <a:pPr algn="ctr"/>
+            <a:r>
+              <a:rPr lang="bg-BG" dirty="0" smtClean="0"/>
+              <a:t>Алгоритъм за двоично търсене</a:t>
+            </a:r>
+            <a:endParaRPr lang="en-US" dirty="0"/>
+          </a:p>
+        </p:txBody>
+      </p:sp>
+      <p:sp>
+        <p:nvSpPr>
+          <p:cNvPr id="3" name="Content Placeholder 2"/>
+          <p:cNvSpPr>
+            <a:spLocks noGrp="1"/>
+          </p:cNvSpPr>
+          <p:nvPr>
+            <p:ph idx="1"/>
+          </p:nvPr>
+        </p:nvSpPr>
+        <p:spPr/>
+        <p:txBody>
+          <a:bodyPr/>
+          <a:lstStyle/>
+          <a:p>
+            <a:r>
+              <a:rPr lang="bg-BG" dirty="0" smtClean="0"/>
+              <a:t>Представлява алгоритъм за търсене в подреден масив</a:t>
+            </a:r>
+            <a:endParaRPr lang="en-US" dirty="0" smtClean="0"/>
+          </a:p>
+          <a:p>
+            <a:r>
+              <a:rPr lang="bg-BG" dirty="0" smtClean="0"/>
+              <a:t>Работи със сложност </a:t>
+            </a:r>
+            <a:r>
+              <a:rPr lang="bg-BG" dirty="0"/>
+              <a:t>О(</a:t>
+            </a:r>
+            <a:r>
+              <a:rPr lang="en-US" dirty="0"/>
+              <a:t>log(N)</a:t>
+            </a:r>
+            <a:r>
+              <a:rPr lang="bg-BG" dirty="0"/>
+              <a:t>)</a:t>
+            </a:r>
+            <a:endParaRPr lang="en-US" dirty="0"/>
+          </a:p>
+          <a:p>
+            <a:r>
+              <a:rPr lang="bg-BG" dirty="0" smtClean="0"/>
+              <a:t>Съществува рекурсивна имплементация</a:t>
+            </a:r>
+          </a:p>
+          <a:p>
+            <a:endParaRPr lang="en-US" dirty="0"/>
+          </a:p>
+        </p:txBody>
+      </p:sp>
+    </p:spTree>
+    <p:extLst>
+      <p:ext uri="{BB962C8B-B14F-4D97-AF65-F5344CB8AC3E}">
+        <p14:creationId xmlns:p14="http://schemas.microsoft.com/office/powerpoint/2010/main" val="130817183"/>
+      </p:ext>
+    </p:extLst>
+  </p:cSld>
+  <p:clrMapOvr>
+    <a:masterClrMapping/>
+  </p:clrMapOvr>
+</p:sld>
+</file>
+
+<file path=ppt/slides/slide13.xml><?xml version="1.0" encoding="utf-8"?>
+<p:sld xmlns:a="http://schemas.openxmlformats.org/drawingml/2006/main" xmlns:r="http://schemas.openxmlformats.org/officeDocument/2006/relationships" xmlns:p="http://schemas.openxmlformats.org/presentationml/2006/main">
+  <p:cSld>
+    <p:spTree>
+      <p:nvGrpSpPr>
+        <p:cNvPr id="1" name=""/>
+        <p:cNvGrpSpPr/>
+        <p:nvPr/>
+      </p:nvGrpSpPr>
+      <p:grpSpPr>
+        <a:xfrm>
+          <a:off x="0" y="0"/>
+          <a:ext cx="0" cy="0"/>
+          <a:chOff x="0" y="0"/>
+          <a:chExt cx="0" cy="0"/>
+        </a:xfrm>
+      </p:grpSpPr>
+      <p:sp>
+        <p:nvSpPr>
+          <p:cNvPr id="2" name="Title 1"/>
+          <p:cNvSpPr>
+            <a:spLocks noGrp="1"/>
+          </p:cNvSpPr>
+          <p:nvPr>
+            <p:ph type="title"/>
+          </p:nvPr>
+        </p:nvSpPr>
+        <p:spPr/>
+        <p:txBody>
+          <a:bodyPr/>
+          <a:lstStyle/>
+          <a:p>
+            <a:pPr algn="ctr"/>
+            <a:r>
+              <a:rPr lang="bg-BG" dirty="0"/>
+              <a:t>Алгоритъм за двоично </a:t>
+            </a:r>
+            <a:r>
+              <a:rPr lang="bg-BG" dirty="0" smtClean="0"/>
+              <a:t>търсене демо</a:t>
+            </a:r>
+            <a:endParaRPr lang="en-US" dirty="0"/>
+          </a:p>
+        </p:txBody>
+      </p:sp>
+      <p:pic>
+        <p:nvPicPr>
+          <p:cNvPr id="2050" name="Picture 2" descr="http://www.algolist.net/img/bst-remove-case-2-3.png"/>
+          <p:cNvPicPr>
+            <a:picLocks noChangeAspect="1" noChangeArrowheads="1"/>
+          </p:cNvPicPr>
+          <p:nvPr/>
+        </p:nvPicPr>
+        <p:blipFill>
+          <a:blip r:embed="rId2">
+            <a:extLst>
+              <a:ext uri="{28A0092B-C50C-407E-A947-70E740481C1C}">
+                <a14:useLocalDpi xmlns:a14="http://schemas.microsoft.com/office/drawing/2010/main" val="0"/>
+              </a:ext>
+            </a:extLst>
+          </a:blip>
+          <a:srcRect/>
+          <a:stretch>
+            <a:fillRect/>
+          </a:stretch>
+        </p:blipFill>
+        <p:spPr bwMode="auto">
+          <a:xfrm>
+            <a:off x="3651421" y="2097088"/>
+            <a:ext cx="4885981" cy="3310895"/>
+          </a:xfrm>
+          <a:prstGeom prst="rect">
+            <a:avLst/>
+          </a:prstGeom>
+          <a:noFill/>
+          <a:extLst>
+            <a:ext uri="{909E8E84-426E-40DD-AFC4-6F175D3DCCD1}">
+              <a14:hiddenFill xmlns:a14="http://schemas.microsoft.com/office/drawing/2010/main">
+                <a:solidFill>
+                  <a:srgbClr val="FFFFFF"/>
+                </a:solidFill>
+              </a14:hiddenFill>
+            </a:ext>
+          </a:extLst>
+        </p:spPr>
+      </p:pic>
+    </p:spTree>
+    <p:extLst>
+      <p:ext uri="{BB962C8B-B14F-4D97-AF65-F5344CB8AC3E}">
+        <p14:creationId xmlns:p14="http://schemas.microsoft.com/office/powerpoint/2010/main" val="3549036483"/>
+      </p:ext>
+    </p:extLst>
+  </p:cSld>
+  <p:clrMapOvr>
+    <a:masterClrMapping/>
+  </p:clrMapOvr>
+</p:sld>
+</file>
+
+<file path=ppt/slides/slide14.xml><?xml version="1.0" encoding="utf-8"?>
+<p:sld xmlns:a="http://schemas.openxmlformats.org/drawingml/2006/main" xmlns:r="http://schemas.openxmlformats.org/officeDocument/2006/relationships" xmlns:p="http://schemas.openxmlformats.org/presentationml/2006/main">
+  <p:cSld>
+    <p:spTree>
+      <p:nvGrpSpPr>
+        <p:cNvPr id="1" name=""/>
+        <p:cNvGrpSpPr/>
+        <p:nvPr/>
+      </p:nvGrpSpPr>
+      <p:grpSpPr>
+        <a:xfrm>
+          <a:off x="0" y="0"/>
+          <a:ext cx="0" cy="0"/>
+          <a:chOff x="0" y="0"/>
+          <a:chExt cx="0" cy="0"/>
+        </a:xfrm>
+      </p:grpSpPr>
+      <p:sp>
+        <p:nvSpPr>
+          <p:cNvPr id="2" name="Title 1"/>
+          <p:cNvSpPr>
+            <a:spLocks noGrp="1"/>
+          </p:cNvSpPr>
+          <p:nvPr>
+            <p:ph type="title"/>
+          </p:nvPr>
+        </p:nvSpPr>
+        <p:spPr/>
+        <p:txBody>
+          <a:bodyPr/>
+          <a:lstStyle/>
+          <a:p>
+            <a:pPr algn="ctr"/>
+            <a:r>
+              <a:rPr lang="bg-BG" dirty="0" smtClean="0"/>
+              <a:t>задача</a:t>
+            </a:r>
+            <a:endParaRPr lang="en-US" dirty="0"/>
+          </a:p>
+        </p:txBody>
+      </p:sp>
+      <p:sp>
+        <p:nvSpPr>
+          <p:cNvPr id="3" name="Content Placeholder 2"/>
+          <p:cNvSpPr>
+            <a:spLocks noGrp="1"/>
+          </p:cNvSpPr>
+          <p:nvPr>
+            <p:ph idx="1"/>
+          </p:nvPr>
+        </p:nvSpPr>
+        <p:spPr/>
+        <p:txBody>
+          <a:bodyPr/>
+          <a:lstStyle/>
+          <a:p>
+            <a:r>
+              <a:rPr lang="bg-BG" dirty="0" smtClean="0"/>
+              <a:t>Направете програма която приема масив от 10 числа. След това програмата приема 1 число.</a:t>
+            </a:r>
+          </a:p>
+          <a:p>
+            <a:r>
+              <a:rPr lang="bg-BG" dirty="0" smtClean="0"/>
+              <a:t>Ако числото фигурира в масива изведете на екрана следващото по големина число от подадените</a:t>
+            </a:r>
+            <a:endParaRPr lang="en-US" dirty="0"/>
+          </a:p>
+        </p:txBody>
+      </p:sp>
+    </p:spTree>
+    <p:extLst>
+      <p:ext uri="{BB962C8B-B14F-4D97-AF65-F5344CB8AC3E}">
+        <p14:creationId xmlns:p14="http://schemas.microsoft.com/office/powerpoint/2010/main" val="3326275830"/>
+      </p:ext>
+    </p:extLst>
+  </p:cSld>
+  <p:clrMapOvr>
+    <a:masterClrMapping/>
+  </p:clrMapOvr>
+</p:sld>
+</file>
+
+<file path=ppt/slides/slide15.xml><?xml version="1.0" encoding="utf-8"?>
+<p:sld xmlns:a="http://schemas.openxmlformats.org/drawingml/2006/main" xmlns:r="http://schemas.openxmlformats.org/officeDocument/2006/relationships" xmlns:p="http://schemas.openxmlformats.org/presentationml/2006/main">
+  <p:cSld>
+    <p:spTree>
+      <p:nvGrpSpPr>
+        <p:cNvPr id="1" name=""/>
+        <p:cNvGrpSpPr/>
+        <p:nvPr/>
+      </p:nvGrpSpPr>
+      <p:grpSpPr>
+        <a:xfrm>
+          <a:off x="0" y="0"/>
+          <a:ext cx="0" cy="0"/>
+          <a:chOff x="0" y="0"/>
+          <a:chExt cx="0" cy="0"/>
+        </a:xfrm>
+      </p:grpSpPr>
+      <p:sp>
+        <p:nvSpPr>
+          <p:cNvPr id="2" name="Title 1"/>
+          <p:cNvSpPr>
+            <a:spLocks noGrp="1"/>
+          </p:cNvSpPr>
+          <p:nvPr>
+            <p:ph type="title"/>
+          </p:nvPr>
+        </p:nvSpPr>
+        <p:spPr/>
+        <p:txBody>
+          <a:bodyPr/>
+          <a:lstStyle/>
+          <a:p>
+            <a:pPr algn="ctr"/>
+            <a:r>
+              <a:rPr lang="bg-BG" dirty="0" smtClean="0"/>
+              <a:t>Сортиране</a:t>
+            </a:r>
+            <a:r>
+              <a:rPr lang="en-US" dirty="0" smtClean="0"/>
+              <a:t> </a:t>
+            </a:r>
+            <a:r>
+              <a:rPr lang="bg-BG" dirty="0" smtClean="0"/>
+              <a:t>чрез пряка селекция</a:t>
+            </a:r>
+            <a:endParaRPr lang="en-US" dirty="0"/>
+          </a:p>
+        </p:txBody>
+      </p:sp>
+      <p:sp>
+        <p:nvSpPr>
+          <p:cNvPr id="3" name="Content Placeholder 2"/>
+          <p:cNvSpPr>
+            <a:spLocks noGrp="1"/>
+          </p:cNvSpPr>
+          <p:nvPr>
+            <p:ph idx="1"/>
+          </p:nvPr>
+        </p:nvSpPr>
+        <p:spPr/>
+        <p:txBody>
+          <a:bodyPr/>
+          <a:lstStyle/>
+          <a:p>
+            <a:r>
+              <a:rPr lang="bg-BG" dirty="0" smtClean="0"/>
+              <a:t>Сортирането</a:t>
+            </a:r>
+            <a:r>
+              <a:rPr lang="en-US" dirty="0" smtClean="0"/>
+              <a:t> </a:t>
+            </a:r>
+            <a:r>
+              <a:rPr lang="bg-BG" dirty="0"/>
+              <a:t>чрез пряка </a:t>
+            </a:r>
+            <a:r>
+              <a:rPr lang="bg-BG" dirty="0" smtClean="0"/>
+              <a:t>селекция е алгоритъм подобен на метода на мехурчето</a:t>
+            </a:r>
+          </a:p>
+          <a:p>
+            <a:r>
+              <a:rPr lang="bg-BG" dirty="0" smtClean="0"/>
+              <a:t>Сложността на алгоритъма е </a:t>
+            </a:r>
+            <a:r>
+              <a:rPr lang="en-US" dirty="0" smtClean="0"/>
+              <a:t>O(N^2)</a:t>
+            </a:r>
+            <a:endParaRPr lang="bg-BG" dirty="0" smtClean="0"/>
+          </a:p>
+          <a:p>
+            <a:r>
+              <a:rPr lang="bg-BG" dirty="0" smtClean="0"/>
+              <a:t>Работи еднакво добре във всички ситуации</a:t>
+            </a:r>
+            <a:endParaRPr lang="en-US" dirty="0"/>
+          </a:p>
+        </p:txBody>
+      </p:sp>
+    </p:spTree>
+    <p:extLst>
+      <p:ext uri="{BB962C8B-B14F-4D97-AF65-F5344CB8AC3E}">
+        <p14:creationId xmlns:p14="http://schemas.microsoft.com/office/powerpoint/2010/main" val="1630991566"/>
+      </p:ext>
+    </p:extLst>
+  </p:cSld>
+  <p:clrMapOvr>
+    <a:masterClrMapping/>
+  </p:clrMapOvr>
+</p:sld>
+</file>
+
+<file path=ppt/slides/slide16.xml><?xml version="1.0" encoding="utf-8"?>
+<p:sld xmlns:a="http://schemas.openxmlformats.org/drawingml/2006/main" xmlns:r="http://schemas.openxmlformats.org/officeDocument/2006/relationships" xmlns:p="http://schemas.openxmlformats.org/presentationml/2006/main">
+  <p:cSld>
+    <p:spTree>
+      <p:nvGrpSpPr>
+        <p:cNvPr id="1" name=""/>
+        <p:cNvGrpSpPr/>
+        <p:nvPr/>
+      </p:nvGrpSpPr>
+      <p:grpSpPr>
+        <a:xfrm>
+          <a:off x="0" y="0"/>
+          <a:ext cx="0" cy="0"/>
+          <a:chOff x="0" y="0"/>
+          <a:chExt cx="0" cy="0"/>
+        </a:xfrm>
+      </p:grpSpPr>
+      <p:sp>
+        <p:nvSpPr>
+          <p:cNvPr id="2" name="Title 1"/>
+          <p:cNvSpPr>
+            <a:spLocks noGrp="1"/>
+          </p:cNvSpPr>
+          <p:nvPr>
+            <p:ph type="title"/>
+          </p:nvPr>
+        </p:nvSpPr>
+        <p:spPr/>
+        <p:txBody>
+          <a:bodyPr/>
+          <a:lstStyle/>
+          <a:p>
+            <a:pPr algn="ctr"/>
+            <a:r>
+              <a:rPr lang="bg-BG" dirty="0"/>
+              <a:t>Сортиране</a:t>
+            </a:r>
+            <a:r>
+              <a:rPr lang="en-US" dirty="0"/>
+              <a:t> </a:t>
+            </a:r>
+            <a:r>
+              <a:rPr lang="bg-BG" dirty="0"/>
+              <a:t>чрез пряка </a:t>
+            </a:r>
+            <a:r>
+              <a:rPr lang="bg-BG" dirty="0" smtClean="0"/>
+              <a:t>селекция демо</a:t>
+            </a:r>
+            <a:endParaRPr lang="en-US" dirty="0"/>
+          </a:p>
+        </p:txBody>
+      </p:sp>
+      <p:pic>
+        <p:nvPicPr>
+          <p:cNvPr id="3074" name="Picture 2" descr="https://thecodeistrueorfalse.files.wordpress.com/2013/09/bubble-sort-example-300px.gif?w=600"/>
+          <p:cNvPicPr>
+            <a:picLocks noChangeAspect="1" noChangeArrowheads="1" noCrop="1"/>
+          </p:cNvPicPr>
+          <p:nvPr/>
+        </p:nvPicPr>
+        <p:blipFill>
+          <a:blip r:embed="rId2">
+            <a:extLst>
+              <a:ext uri="{28A0092B-C50C-407E-A947-70E740481C1C}">
+                <a14:useLocalDpi xmlns:a14="http://schemas.microsoft.com/office/drawing/2010/main" val="0"/>
+              </a:ext>
+            </a:extLst>
+          </a:blip>
+          <a:srcRect/>
+          <a:stretch>
+            <a:fillRect/>
+          </a:stretch>
+        </p:blipFill>
+        <p:spPr bwMode="auto">
+          <a:xfrm>
+            <a:off x="2436340" y="2097088"/>
+            <a:ext cx="7316144" cy="4389686"/>
+          </a:xfrm>
+          <a:prstGeom prst="rect">
+            <a:avLst/>
+          </a:prstGeom>
+          <a:noFill/>
+          <a:extLst>
+            <a:ext uri="{909E8E84-426E-40DD-AFC4-6F175D3DCCD1}">
+              <a14:hiddenFill xmlns:a14="http://schemas.microsoft.com/office/drawing/2010/main">
+                <a:solidFill>
+                  <a:srgbClr val="FFFFFF"/>
+                </a:solidFill>
+              </a14:hiddenFill>
+            </a:ext>
+          </a:extLst>
+        </p:spPr>
+      </p:pic>
+    </p:spTree>
+    <p:extLst>
+      <p:ext uri="{BB962C8B-B14F-4D97-AF65-F5344CB8AC3E}">
+        <p14:creationId xmlns:p14="http://schemas.microsoft.com/office/powerpoint/2010/main" val="3721919098"/>
+      </p:ext>
+    </p:extLst>
+  </p:cSld>
+  <p:clrMapOvr>
+    <a:masterClrMapping/>
+  </p:clrMapOvr>
+</p:sld>
+</file>
+
+<file path=ppt/slides/slide17.xml><?xml version="1.0" encoding="utf-8"?>
+<p:sld xmlns:a="http://schemas.openxmlformats.org/drawingml/2006/main" xmlns:r="http://schemas.openxmlformats.org/officeDocument/2006/relationships" xmlns:p="http://schemas.openxmlformats.org/presentationml/2006/main">
+  <p:cSld>
+    <p:spTree>
+      <p:nvGrpSpPr>
+        <p:cNvPr id="1" name=""/>
+        <p:cNvGrpSpPr/>
+        <p:nvPr/>
+      </p:nvGrpSpPr>
+      <p:grpSpPr>
+        <a:xfrm>
+          <a:off x="0" y="0"/>
+          <a:ext cx="0" cy="0"/>
+          <a:chOff x="0" y="0"/>
+          <a:chExt cx="0" cy="0"/>
+        </a:xfrm>
+      </p:grpSpPr>
+      <p:sp>
+        <p:nvSpPr>
+          <p:cNvPr id="2" name="Title 1"/>
+          <p:cNvSpPr>
+            <a:spLocks noGrp="1"/>
+          </p:cNvSpPr>
+          <p:nvPr>
+            <p:ph type="title"/>
+          </p:nvPr>
+        </p:nvSpPr>
+        <p:spPr/>
+        <p:txBody>
+          <a:bodyPr/>
+          <a:lstStyle/>
+          <a:p>
+            <a:pPr algn="ctr"/>
+            <a:r>
+              <a:rPr lang="bg-BG" dirty="0" smtClean="0"/>
+              <a:t>Сортиране чрез разделяне</a:t>
+            </a:r>
+            <a:endParaRPr lang="en-US" dirty="0"/>
+          </a:p>
+        </p:txBody>
+      </p:sp>
+      <p:sp>
+        <p:nvSpPr>
+          <p:cNvPr id="3" name="Content Placeholder 2"/>
+          <p:cNvSpPr>
+            <a:spLocks noGrp="1"/>
+          </p:cNvSpPr>
+          <p:nvPr>
+            <p:ph idx="1"/>
+          </p:nvPr>
+        </p:nvSpPr>
+        <p:spPr/>
+        <p:txBody>
+          <a:bodyPr/>
+          <a:lstStyle/>
+          <a:p>
+            <a:r>
+              <a:rPr lang="bg-BG" dirty="0" smtClean="0"/>
+              <a:t>Разделя неподредения масив на части като всяка част съдържа 1 елемент</a:t>
+            </a:r>
+          </a:p>
+          <a:p>
+            <a:r>
+              <a:rPr lang="bg-BG" dirty="0" smtClean="0"/>
+              <a:t>Отделните части се събират като образуват подредена колекция</a:t>
+            </a:r>
+          </a:p>
+          <a:p>
+            <a:r>
+              <a:rPr lang="bg-BG" dirty="0" smtClean="0"/>
+              <a:t>Сортирането чрез разделяне работи със сложност </a:t>
+            </a:r>
+            <a:r>
+              <a:rPr lang="en-US" dirty="0" smtClean="0"/>
+              <a:t>O</a:t>
+            </a:r>
+            <a:r>
+              <a:rPr lang="bg-BG" dirty="0" smtClean="0"/>
+              <a:t>(</a:t>
+            </a:r>
+            <a:r>
+              <a:rPr lang="en-US" dirty="0" smtClean="0"/>
+              <a:t>N log(N)</a:t>
+            </a:r>
+            <a:r>
+              <a:rPr lang="bg-BG" dirty="0" smtClean="0"/>
+              <a:t>)</a:t>
+            </a:r>
+          </a:p>
+        </p:txBody>
+      </p:sp>
+    </p:spTree>
+    <p:extLst>
+      <p:ext uri="{BB962C8B-B14F-4D97-AF65-F5344CB8AC3E}">
+        <p14:creationId xmlns:p14="http://schemas.microsoft.com/office/powerpoint/2010/main" val="86627355"/>
+      </p:ext>
+    </p:extLst>
+  </p:cSld>
+  <p:clrMapOvr>
+    <a:masterClrMapping/>
+  </p:clrMapOvr>
+</p:sld>
+</file>
+
+<file path=ppt/slides/slide18.xml><?xml version="1.0" encoding="utf-8"?>
+<p:sld xmlns:a="http://schemas.openxmlformats.org/drawingml/2006/main" xmlns:r="http://schemas.openxmlformats.org/officeDocument/2006/relationships" xmlns:p="http://schemas.openxmlformats.org/presentationml/2006/main">
+  <p:cSld>
+    <p:spTree>
+      <p:nvGrpSpPr>
+        <p:cNvPr id="1" name=""/>
+        <p:cNvGrpSpPr/>
+        <p:nvPr/>
+      </p:nvGrpSpPr>
+      <p:grpSpPr>
+        <a:xfrm>
+          <a:off x="0" y="0"/>
+          <a:ext cx="0" cy="0"/>
+          <a:chOff x="0" y="0"/>
+          <a:chExt cx="0" cy="0"/>
+        </a:xfrm>
+      </p:grpSpPr>
+      <p:sp>
+        <p:nvSpPr>
+          <p:cNvPr id="2" name="Title 1"/>
+          <p:cNvSpPr>
+            <a:spLocks noGrp="1"/>
+          </p:cNvSpPr>
+          <p:nvPr>
+            <p:ph type="title"/>
+          </p:nvPr>
+        </p:nvSpPr>
+        <p:spPr/>
+        <p:txBody>
+          <a:bodyPr/>
+          <a:lstStyle/>
+          <a:p>
+            <a:pPr algn="ctr"/>
+            <a:r>
+              <a:rPr lang="bg-BG" dirty="0"/>
+              <a:t>Сортиране чрез </a:t>
+            </a:r>
+            <a:r>
+              <a:rPr lang="bg-BG" dirty="0" smtClean="0"/>
+              <a:t>разделяне</a:t>
+            </a:r>
+            <a:r>
+              <a:rPr lang="en-US" dirty="0" smtClean="0"/>
+              <a:t> </a:t>
+            </a:r>
+            <a:r>
+              <a:rPr lang="bg-BG" dirty="0" smtClean="0"/>
+              <a:t>демо</a:t>
+            </a:r>
+            <a:endParaRPr lang="en-US" dirty="0"/>
+          </a:p>
+        </p:txBody>
+      </p:sp>
+      <p:pic>
+        <p:nvPicPr>
+          <p:cNvPr id="4098" name="Picture 2" descr="Merge Sort"/>
+          <p:cNvPicPr>
+            <a:picLocks noChangeAspect="1" noChangeArrowheads="1"/>
+          </p:cNvPicPr>
+          <p:nvPr/>
+        </p:nvPicPr>
+        <p:blipFill>
+          <a:blip r:embed="rId2">
+            <a:extLst>
+              <a:ext uri="{28A0092B-C50C-407E-A947-70E740481C1C}">
+                <a14:useLocalDpi xmlns:a14="http://schemas.microsoft.com/office/drawing/2010/main" val="0"/>
+              </a:ext>
+            </a:extLst>
+          </a:blip>
+          <a:srcRect/>
+          <a:stretch>
+            <a:fillRect/>
+          </a:stretch>
+        </p:blipFill>
+        <p:spPr bwMode="auto">
+          <a:xfrm>
+            <a:off x="4067355" y="2097088"/>
+            <a:ext cx="4054114" cy="3900058"/>
+          </a:xfrm>
+          <a:prstGeom prst="rect">
+            <a:avLst/>
+          </a:prstGeom>
+          <a:noFill/>
+          <a:extLst>
+            <a:ext uri="{909E8E84-426E-40DD-AFC4-6F175D3DCCD1}">
+              <a14:hiddenFill xmlns:a14="http://schemas.microsoft.com/office/drawing/2010/main">
+                <a:solidFill>
+                  <a:srgbClr val="FFFFFF"/>
+                </a:solidFill>
+              </a14:hiddenFill>
+            </a:ext>
+          </a:extLst>
+        </p:spPr>
+      </p:pic>
+    </p:spTree>
+    <p:extLst>
+      <p:ext uri="{BB962C8B-B14F-4D97-AF65-F5344CB8AC3E}">
+        <p14:creationId xmlns:p14="http://schemas.microsoft.com/office/powerpoint/2010/main" val="2647073481"/>
+      </p:ext>
+    </p:extLst>
+  </p:cSld>
+  <p:clrMapOvr>
+    <a:masterClrMapping/>
+  </p:clrMapOvr>
+</p:sld>
+</file>
+
+<file path=ppt/slides/slide19.xml><?xml version="1.0" encoding="utf-8"?>
+<p:sld xmlns:a="http://schemas.openxmlformats.org/drawingml/2006/main" xmlns:r="http://schemas.openxmlformats.org/officeDocument/2006/relationships" xmlns:p="http://schemas.openxmlformats.org/presentationml/2006/main">
+  <p:cSld>
+    <p:spTree>
+      <p:nvGrpSpPr>
+        <p:cNvPr id="1" name=""/>
+        <p:cNvGrpSpPr/>
+        <p:nvPr/>
+      </p:nvGrpSpPr>
+      <p:grpSpPr>
+        <a:xfrm>
+          <a:off x="0" y="0"/>
+          <a:ext cx="0" cy="0"/>
+          <a:chOff x="0" y="0"/>
+          <a:chExt cx="0" cy="0"/>
+        </a:xfrm>
+      </p:grpSpPr>
+      <p:sp>
+        <p:nvSpPr>
+          <p:cNvPr id="2" name="Title 1"/>
+          <p:cNvSpPr>
+            <a:spLocks noGrp="1"/>
+          </p:cNvSpPr>
+          <p:nvPr>
+            <p:ph type="title"/>
+          </p:nvPr>
+        </p:nvSpPr>
+        <p:spPr/>
+        <p:txBody>
+          <a:bodyPr/>
+          <a:lstStyle/>
+          <a:p>
+            <a:pPr algn="ctr"/>
+            <a:r>
+              <a:rPr lang="bg-BG" dirty="0" smtClean="0"/>
+              <a:t>задача</a:t>
+            </a:r>
+            <a:endParaRPr lang="en-US" dirty="0"/>
+          </a:p>
+        </p:txBody>
+      </p:sp>
+      <p:sp>
+        <p:nvSpPr>
+          <p:cNvPr id="3" name="Content Placeholder 2"/>
+          <p:cNvSpPr>
+            <a:spLocks noGrp="1"/>
+          </p:cNvSpPr>
+          <p:nvPr>
+            <p:ph idx="1"/>
+          </p:nvPr>
+        </p:nvSpPr>
+        <p:spPr/>
+        <p:txBody>
+          <a:bodyPr/>
+          <a:lstStyle/>
+          <a:p>
+            <a:r>
+              <a:rPr lang="bg-BG" dirty="0" smtClean="0"/>
+              <a:t>Направете програма която приема 10 числа и ги сортира</a:t>
+            </a:r>
+          </a:p>
+          <a:p>
+            <a:r>
+              <a:rPr lang="bg-BG" dirty="0" smtClean="0"/>
+              <a:t>Използвайте различни алгоритми за сортиране</a:t>
+            </a:r>
+            <a:endParaRPr lang="en-US" dirty="0"/>
+          </a:p>
+        </p:txBody>
+      </p:sp>
+    </p:spTree>
+    <p:extLst>
+      <p:ext uri="{BB962C8B-B14F-4D97-AF65-F5344CB8AC3E}">
+        <p14:creationId xmlns:p14="http://schemas.microsoft.com/office/powerpoint/2010/main" val="4143012404"/>
+      </p:ext>
+    </p:extLst>
+  </p:cSld>
+  <p:clrMapOvr>
+    <a:masterClrMapping/>
+  </p:clrMapOvr>
+</p:sld>
+</file>
+
 <file path=ppt/slides/slide2.xml><?xml version="1.0" encoding="utf-8"?>
 <p:sld xmlns:a="http://schemas.openxmlformats.org/drawingml/2006/main" xmlns:r="http://schemas.openxmlformats.org/officeDocument/2006/relationships" xmlns:p="http://schemas.openxmlformats.org/presentationml/2006/main">
   <p:cSld>
@@ -12645,6 +15685,382 @@
     <p:extLst>
       <p:ext uri="{BB962C8B-B14F-4D97-AF65-F5344CB8AC3E}">
         <p14:creationId xmlns:p14="http://schemas.microsoft.com/office/powerpoint/2010/main" val="2383145558"/>
+      </p:ext>
+    </p:extLst>
+  </p:cSld>
+  <p:clrMapOvr>
+    <a:masterClrMapping/>
+  </p:clrMapOvr>
+</p:sld>
+</file>
+
+<file path=ppt/slides/slide20.xml><?xml version="1.0" encoding="utf-8"?>
+<p:sld xmlns:a="http://schemas.openxmlformats.org/drawingml/2006/main" xmlns:r="http://schemas.openxmlformats.org/officeDocument/2006/relationships" xmlns:p="http://schemas.openxmlformats.org/presentationml/2006/main">
+  <p:cSld>
+    <p:spTree>
+      <p:nvGrpSpPr>
+        <p:cNvPr id="1" name=""/>
+        <p:cNvGrpSpPr/>
+        <p:nvPr/>
+      </p:nvGrpSpPr>
+      <p:grpSpPr>
+        <a:xfrm>
+          <a:off x="0" y="0"/>
+          <a:ext cx="0" cy="0"/>
+          <a:chOff x="0" y="0"/>
+          <a:chExt cx="0" cy="0"/>
+        </a:xfrm>
+      </p:grpSpPr>
+      <p:sp>
+        <p:nvSpPr>
+          <p:cNvPr id="2" name="Title 1"/>
+          <p:cNvSpPr>
+            <a:spLocks noGrp="1"/>
+          </p:cNvSpPr>
+          <p:nvPr>
+            <p:ph type="title"/>
+          </p:nvPr>
+        </p:nvSpPr>
+        <p:spPr/>
+        <p:txBody>
+          <a:bodyPr/>
+          <a:lstStyle/>
+          <a:p>
+            <a:r>
+              <a:rPr lang="bg-BG" dirty="0" smtClean="0"/>
+              <a:t>Засичане на времето за изпълнение с </a:t>
+            </a:r>
+            <a:r>
+              <a:rPr lang="en-US" dirty="0" smtClean="0"/>
+              <a:t>JAVA</a:t>
+            </a:r>
+            <a:endParaRPr lang="en-US" dirty="0"/>
+          </a:p>
+        </p:txBody>
+      </p:sp>
+      <p:sp>
+        <p:nvSpPr>
+          <p:cNvPr id="3" name="Content Placeholder 2"/>
+          <p:cNvSpPr>
+            <a:spLocks noGrp="1"/>
+          </p:cNvSpPr>
+          <p:nvPr>
+            <p:ph idx="1"/>
+          </p:nvPr>
+        </p:nvSpPr>
+        <p:spPr/>
+        <p:txBody>
+          <a:bodyPr/>
+          <a:lstStyle/>
+          <a:p>
+            <a:r>
+              <a:rPr lang="bg-BG" dirty="0" smtClean="0"/>
+              <a:t>Често пъти за да оценим даден алгоритъм трябва да засечем времето за изпълнение на определен блок от код</a:t>
+            </a:r>
+          </a:p>
+          <a:p>
+            <a:r>
+              <a:rPr lang="bg-BG" dirty="0" smtClean="0"/>
+              <a:t>Сложността на даден алгоритъм + времето за изпълнение на имплементацията му ни дават точна представа за качеството му</a:t>
+            </a:r>
+            <a:endParaRPr lang="en-US" dirty="0"/>
+          </a:p>
+        </p:txBody>
+      </p:sp>
+    </p:spTree>
+    <p:extLst>
+      <p:ext uri="{BB962C8B-B14F-4D97-AF65-F5344CB8AC3E}">
+        <p14:creationId xmlns:p14="http://schemas.microsoft.com/office/powerpoint/2010/main" val="14910133"/>
+      </p:ext>
+    </p:extLst>
+  </p:cSld>
+  <p:clrMapOvr>
+    <a:masterClrMapping/>
+  </p:clrMapOvr>
+</p:sld>
+</file>
+
+<file path=ppt/slides/slide21.xml><?xml version="1.0" encoding="utf-8"?>
+<p:sld xmlns:a="http://schemas.openxmlformats.org/drawingml/2006/main" xmlns:r="http://schemas.openxmlformats.org/officeDocument/2006/relationships" xmlns:p="http://schemas.openxmlformats.org/presentationml/2006/main">
+  <p:cSld>
+    <p:spTree>
+      <p:nvGrpSpPr>
+        <p:cNvPr id="1" name=""/>
+        <p:cNvGrpSpPr/>
+        <p:nvPr/>
+      </p:nvGrpSpPr>
+      <p:grpSpPr>
+        <a:xfrm>
+          <a:off x="0" y="0"/>
+          <a:ext cx="0" cy="0"/>
+          <a:chOff x="0" y="0"/>
+          <a:chExt cx="0" cy="0"/>
+        </a:xfrm>
+      </p:grpSpPr>
+      <p:sp>
+        <p:nvSpPr>
+          <p:cNvPr id="2" name="Title 1"/>
+          <p:cNvSpPr>
+            <a:spLocks noGrp="1"/>
+          </p:cNvSpPr>
+          <p:nvPr>
+            <p:ph type="title"/>
+          </p:nvPr>
+        </p:nvSpPr>
+        <p:spPr/>
+        <p:txBody>
+          <a:bodyPr/>
+          <a:lstStyle/>
+          <a:p>
+            <a:pPr algn="ctr"/>
+            <a:r>
+              <a:rPr lang="bg-BG" dirty="0"/>
+              <a:t>Засичане на времето за изпълнение с </a:t>
+            </a:r>
+            <a:r>
+              <a:rPr lang="en-US" dirty="0" smtClean="0"/>
+              <a:t>JAVA </a:t>
+            </a:r>
+            <a:r>
+              <a:rPr lang="bg-BG" dirty="0" smtClean="0"/>
+              <a:t>демо</a:t>
+            </a:r>
+            <a:endParaRPr lang="en-US" dirty="0"/>
+          </a:p>
+        </p:txBody>
+      </p:sp>
+      <p:pic>
+        <p:nvPicPr>
+          <p:cNvPr id="5122" name="Picture 2" descr="http://www.watermarklearning.com/blog/wp-content/uploads/2013/03/stopwatch.jpg"/>
+          <p:cNvPicPr>
+            <a:picLocks noChangeAspect="1" noChangeArrowheads="1"/>
+          </p:cNvPicPr>
+          <p:nvPr/>
+        </p:nvPicPr>
+        <p:blipFill>
+          <a:blip r:embed="rId2">
+            <a:extLst>
+              <a:ext uri="{28A0092B-C50C-407E-A947-70E740481C1C}">
+                <a14:useLocalDpi xmlns:a14="http://schemas.microsoft.com/office/drawing/2010/main" val="0"/>
+              </a:ext>
+            </a:extLst>
+          </a:blip>
+          <a:srcRect/>
+          <a:stretch>
+            <a:fillRect/>
+          </a:stretch>
+        </p:blipFill>
+        <p:spPr bwMode="auto">
+          <a:xfrm>
+            <a:off x="3967270" y="2097088"/>
+            <a:ext cx="4254284" cy="4254284"/>
+          </a:xfrm>
+          <a:prstGeom prst="rect">
+            <a:avLst/>
+          </a:prstGeom>
+          <a:noFill/>
+          <a:extLst>
+            <a:ext uri="{909E8E84-426E-40DD-AFC4-6F175D3DCCD1}">
+              <a14:hiddenFill xmlns:a14="http://schemas.microsoft.com/office/drawing/2010/main">
+                <a:solidFill>
+                  <a:srgbClr val="FFFFFF"/>
+                </a:solidFill>
+              </a14:hiddenFill>
+            </a:ext>
+          </a:extLst>
+        </p:spPr>
+      </p:pic>
+    </p:spTree>
+    <p:extLst>
+      <p:ext uri="{BB962C8B-B14F-4D97-AF65-F5344CB8AC3E}">
+        <p14:creationId xmlns:p14="http://schemas.microsoft.com/office/powerpoint/2010/main" val="3937888990"/>
+      </p:ext>
+    </p:extLst>
+  </p:cSld>
+  <p:clrMapOvr>
+    <a:masterClrMapping/>
+  </p:clrMapOvr>
+</p:sld>
+</file>
+
+<file path=ppt/slides/slide22.xml><?xml version="1.0" encoding="utf-8"?>
+<p:sld xmlns:a="http://schemas.openxmlformats.org/drawingml/2006/main" xmlns:r="http://schemas.openxmlformats.org/officeDocument/2006/relationships" xmlns:p="http://schemas.openxmlformats.org/presentationml/2006/main">
+  <p:cSld>
+    <p:spTree>
+      <p:nvGrpSpPr>
+        <p:cNvPr id="1" name=""/>
+        <p:cNvGrpSpPr/>
+        <p:nvPr/>
+      </p:nvGrpSpPr>
+      <p:grpSpPr>
+        <a:xfrm>
+          <a:off x="0" y="0"/>
+          <a:ext cx="0" cy="0"/>
+          <a:chOff x="0" y="0"/>
+          <a:chExt cx="0" cy="0"/>
+        </a:xfrm>
+      </p:grpSpPr>
+      <p:sp>
+        <p:nvSpPr>
+          <p:cNvPr id="2" name="Title 1"/>
+          <p:cNvSpPr>
+            <a:spLocks noGrp="1"/>
+          </p:cNvSpPr>
+          <p:nvPr>
+            <p:ph type="title"/>
+          </p:nvPr>
+        </p:nvSpPr>
+        <p:spPr/>
+        <p:txBody>
+          <a:bodyPr/>
+          <a:lstStyle/>
+          <a:p>
+            <a:pPr algn="ctr"/>
+            <a:r>
+              <a:rPr lang="bg-BG" dirty="0" smtClean="0"/>
+              <a:t>задача</a:t>
+            </a:r>
+            <a:endParaRPr lang="en-US" dirty="0"/>
+          </a:p>
+        </p:txBody>
+      </p:sp>
+      <p:sp>
+        <p:nvSpPr>
+          <p:cNvPr id="3" name="Content Placeholder 2"/>
+          <p:cNvSpPr>
+            <a:spLocks noGrp="1"/>
+          </p:cNvSpPr>
+          <p:nvPr>
+            <p:ph idx="1"/>
+          </p:nvPr>
+        </p:nvSpPr>
+        <p:spPr/>
+        <p:txBody>
+          <a:bodyPr/>
+          <a:lstStyle/>
+          <a:p>
+            <a:r>
+              <a:rPr lang="bg-BG" dirty="0" smtClean="0"/>
+              <a:t>Засичайки времето за изпълнение направете сравнение на изучените </a:t>
+            </a:r>
+            <a:r>
+              <a:rPr lang="bg-BG" dirty="0" err="1" smtClean="0"/>
+              <a:t>алогоритми</a:t>
+            </a:r>
+            <a:r>
+              <a:rPr lang="bg-BG" dirty="0" smtClean="0"/>
+              <a:t> като ги прилагате върху случайно </a:t>
+            </a:r>
+            <a:r>
+              <a:rPr lang="bg-BG" dirty="0" err="1" smtClean="0"/>
+              <a:t>ренерирани</a:t>
+            </a:r>
+            <a:r>
+              <a:rPr lang="bg-BG" dirty="0" smtClean="0"/>
+              <a:t> колекции от 1 000 000</a:t>
+            </a:r>
+          </a:p>
+        </p:txBody>
+      </p:sp>
+    </p:spTree>
+    <p:extLst>
+      <p:ext uri="{BB962C8B-B14F-4D97-AF65-F5344CB8AC3E}">
+        <p14:creationId xmlns:p14="http://schemas.microsoft.com/office/powerpoint/2010/main" val="2034878334"/>
+      </p:ext>
+    </p:extLst>
+  </p:cSld>
+  <p:clrMapOvr>
+    <a:masterClrMapping/>
+  </p:clrMapOvr>
+</p:sld>
+</file>
+
+<file path=ppt/slides/slide23.xml><?xml version="1.0" encoding="utf-8"?>
+<p:sld xmlns:a="http://schemas.openxmlformats.org/drawingml/2006/main" xmlns:r="http://schemas.openxmlformats.org/officeDocument/2006/relationships" xmlns:p="http://schemas.openxmlformats.org/presentationml/2006/main">
+  <p:cSld>
+    <p:spTree>
+      <p:nvGrpSpPr>
+        <p:cNvPr id="1" name=""/>
+        <p:cNvGrpSpPr/>
+        <p:nvPr/>
+      </p:nvGrpSpPr>
+      <p:grpSpPr>
+        <a:xfrm>
+          <a:off x="0" y="0"/>
+          <a:ext cx="0" cy="0"/>
+          <a:chOff x="0" y="0"/>
+          <a:chExt cx="0" cy="0"/>
+        </a:xfrm>
+      </p:grpSpPr>
+      <p:sp>
+        <p:nvSpPr>
+          <p:cNvPr id="2" name="Title 1"/>
+          <p:cNvSpPr>
+            <a:spLocks noGrp="1"/>
+          </p:cNvSpPr>
+          <p:nvPr>
+            <p:ph type="title"/>
+          </p:nvPr>
+        </p:nvSpPr>
+        <p:spPr/>
+        <p:txBody>
+          <a:bodyPr/>
+          <a:lstStyle/>
+          <a:p>
+            <a:pPr algn="ctr"/>
+            <a:r>
+              <a:rPr lang="bg-BG" dirty="0" smtClean="0"/>
+              <a:t>Въпроси</a:t>
+            </a:r>
+            <a:endParaRPr lang="en-US" dirty="0"/>
+          </a:p>
+        </p:txBody>
+      </p:sp>
+      <p:pic>
+        <p:nvPicPr>
+          <p:cNvPr id="6146" name="Picture 2" descr="http://en.hdyo.org/assets/ask-question-1-ff9bc6fa5eaa0d7667ae7a5a4c61330c.jpg"/>
+          <p:cNvPicPr>
+            <a:picLocks noChangeAspect="1" noChangeArrowheads="1"/>
+          </p:cNvPicPr>
+          <p:nvPr/>
+        </p:nvPicPr>
+        <p:blipFill>
+          <a:blip r:embed="rId2">
+            <a:extLst>
+              <a:ext uri="{28A0092B-C50C-407E-A947-70E740481C1C}">
+                <a14:useLocalDpi xmlns:a14="http://schemas.microsoft.com/office/drawing/2010/main" val="0"/>
+              </a:ext>
+            </a:extLst>
+          </a:blip>
+          <a:srcRect/>
+          <a:stretch>
+            <a:fillRect/>
+          </a:stretch>
+        </p:blipFill>
+        <p:spPr bwMode="auto">
+          <a:xfrm>
+            <a:off x="3297194" y="2097088"/>
+            <a:ext cx="5594436" cy="4229394"/>
+          </a:xfrm>
+          <a:prstGeom prst="rect">
+            <a:avLst/>
+          </a:prstGeom>
+          <a:noFill/>
+          <a:extLst>
+            <a:ext uri="{909E8E84-426E-40DD-AFC4-6F175D3DCCD1}">
+              <a14:hiddenFill xmlns:a14="http://schemas.microsoft.com/office/drawing/2010/main">
+                <a:solidFill>
+                  <a:srgbClr val="FFFFFF"/>
+                </a:solidFill>
+              </a14:hiddenFill>
+            </a:ext>
+          </a:extLst>
+        </p:spPr>
+      </p:pic>
+    </p:spTree>
+    <p:extLst>
+      <p:ext uri="{BB962C8B-B14F-4D97-AF65-F5344CB8AC3E}">
+        <p14:creationId xmlns:p14="http://schemas.microsoft.com/office/powerpoint/2010/main" val="484507398"/>
       </p:ext>
     </p:extLst>
   </p:cSld>
@@ -13021,6 +16437,443 @@
     <p:extLst>
       <p:ext uri="{BB962C8B-B14F-4D97-AF65-F5344CB8AC3E}">
         <p14:creationId xmlns:p14="http://schemas.microsoft.com/office/powerpoint/2010/main" val="546101104"/>
+      </p:ext>
+    </p:extLst>
+  </p:cSld>
+  <p:clrMapOvr>
+    <a:masterClrMapping/>
+  </p:clrMapOvr>
+</p:sld>
+</file>
+
+<file path=ppt/slides/slide6.xml><?xml version="1.0" encoding="utf-8"?>
+<p:sld xmlns:a="http://schemas.openxmlformats.org/drawingml/2006/main" xmlns:r="http://schemas.openxmlformats.org/officeDocument/2006/relationships" xmlns:p="http://schemas.openxmlformats.org/presentationml/2006/main">
+  <p:cSld>
+    <p:spTree>
+      <p:nvGrpSpPr>
+        <p:cNvPr id="1" name=""/>
+        <p:cNvGrpSpPr/>
+        <p:nvPr/>
+      </p:nvGrpSpPr>
+      <p:grpSpPr>
+        <a:xfrm>
+          <a:off x="0" y="0"/>
+          <a:ext cx="0" cy="0"/>
+          <a:chOff x="0" y="0"/>
+          <a:chExt cx="0" cy="0"/>
+        </a:xfrm>
+      </p:grpSpPr>
+      <p:sp>
+        <p:nvSpPr>
+          <p:cNvPr id="2" name="Title 1"/>
+          <p:cNvSpPr>
+            <a:spLocks noGrp="1"/>
+          </p:cNvSpPr>
+          <p:nvPr>
+            <p:ph type="title"/>
+          </p:nvPr>
+        </p:nvSpPr>
+        <p:spPr/>
+        <p:txBody>
+          <a:bodyPr/>
+          <a:lstStyle/>
+          <a:p>
+            <a:pPr algn="ctr"/>
+            <a:r>
+              <a:rPr lang="bg-BG" dirty="0" smtClean="0"/>
+              <a:t>задача</a:t>
+            </a:r>
+            <a:endParaRPr lang="en-US" dirty="0"/>
+          </a:p>
+        </p:txBody>
+      </p:sp>
+      <p:sp>
+        <p:nvSpPr>
+          <p:cNvPr id="3" name="Content Placeholder 2"/>
+          <p:cNvSpPr>
+            <a:spLocks noGrp="1"/>
+          </p:cNvSpPr>
+          <p:nvPr>
+            <p:ph idx="1"/>
+          </p:nvPr>
+        </p:nvSpPr>
+        <p:spPr/>
+        <p:txBody>
+          <a:bodyPr>
+            <a:normAutofit fontScale="92500" lnSpcReduction="10000"/>
+          </a:bodyPr>
+          <a:lstStyle/>
+          <a:p>
+            <a:r>
+              <a:rPr lang="bg-BG" dirty="0" smtClean="0"/>
+              <a:t>Напишете програма, която приема символен низ от конзолата и го обработва както следва:</a:t>
+            </a:r>
+          </a:p>
+          <a:p>
+            <a:r>
+              <a:rPr lang="bg-BG" dirty="0" smtClean="0"/>
+              <a:t>Ако срещне малка буква – буквата се поставя  в опашка</a:t>
+            </a:r>
+          </a:p>
+          <a:p>
+            <a:r>
+              <a:rPr lang="bg-BG" dirty="0" smtClean="0"/>
+              <a:t>Ако срещне голяма буква -  буквата се поставя в стек</a:t>
+            </a:r>
+          </a:p>
+          <a:p>
+            <a:r>
+              <a:rPr lang="bg-BG" dirty="0" smtClean="0"/>
+              <a:t>Изведете данните от опашката и стека на екрана.</a:t>
+            </a:r>
+          </a:p>
+          <a:p>
+            <a:r>
+              <a:rPr lang="bg-BG" dirty="0" smtClean="0"/>
+              <a:t>Примерен низ</a:t>
+            </a:r>
+            <a:endParaRPr lang="bg-BG" dirty="0"/>
+          </a:p>
+          <a:p>
+            <a:r>
+              <a:rPr lang="bg-BG" dirty="0" err="1"/>
+              <a:t>А</a:t>
+            </a:r>
+            <a:r>
+              <a:rPr lang="bg-BG" dirty="0" err="1" smtClean="0"/>
+              <a:t>оВбиАчЖаДм</a:t>
+            </a:r>
+            <a:endParaRPr lang="en-US" dirty="0"/>
+          </a:p>
+        </p:txBody>
+      </p:sp>
+    </p:spTree>
+    <p:extLst>
+      <p:ext uri="{BB962C8B-B14F-4D97-AF65-F5344CB8AC3E}">
+        <p14:creationId xmlns:p14="http://schemas.microsoft.com/office/powerpoint/2010/main" val="2161820272"/>
+      </p:ext>
+    </p:extLst>
+  </p:cSld>
+  <p:clrMapOvr>
+    <a:masterClrMapping/>
+  </p:clrMapOvr>
+</p:sld>
+</file>
+
+<file path=ppt/slides/slide7.xml><?xml version="1.0" encoding="utf-8"?>
+<p:sld xmlns:a="http://schemas.openxmlformats.org/drawingml/2006/main" xmlns:r="http://schemas.openxmlformats.org/officeDocument/2006/relationships" xmlns:p="http://schemas.openxmlformats.org/presentationml/2006/main">
+  <p:cSld>
+    <p:spTree>
+      <p:nvGrpSpPr>
+        <p:cNvPr id="1" name=""/>
+        <p:cNvGrpSpPr/>
+        <p:nvPr/>
+      </p:nvGrpSpPr>
+      <p:grpSpPr>
+        <a:xfrm>
+          <a:off x="0" y="0"/>
+          <a:ext cx="0" cy="0"/>
+          <a:chOff x="0" y="0"/>
+          <a:chExt cx="0" cy="0"/>
+        </a:xfrm>
+      </p:grpSpPr>
+      <p:sp>
+        <p:nvSpPr>
+          <p:cNvPr id="2" name="Title 1"/>
+          <p:cNvSpPr>
+            <a:spLocks noGrp="1"/>
+          </p:cNvSpPr>
+          <p:nvPr>
+            <p:ph type="title"/>
+          </p:nvPr>
+        </p:nvSpPr>
+        <p:spPr/>
+        <p:txBody>
+          <a:bodyPr/>
+          <a:lstStyle/>
+          <a:p>
+            <a:pPr algn="ctr"/>
+            <a:r>
+              <a:rPr lang="bg-BG" dirty="0" err="1" smtClean="0"/>
+              <a:t>АЛгоритъм</a:t>
+            </a:r>
+            <a:endParaRPr lang="en-US" dirty="0"/>
+          </a:p>
+        </p:txBody>
+      </p:sp>
+      <p:sp>
+        <p:nvSpPr>
+          <p:cNvPr id="3" name="Content Placeholder 2"/>
+          <p:cNvSpPr>
+            <a:spLocks noGrp="1"/>
+          </p:cNvSpPr>
+          <p:nvPr>
+            <p:ph idx="1"/>
+          </p:nvPr>
+        </p:nvSpPr>
+        <p:spPr/>
+        <p:txBody>
+          <a:bodyPr/>
+          <a:lstStyle/>
+          <a:p>
+            <a:r>
+              <a:rPr lang="ru-RU" dirty="0"/>
+              <a:t> </a:t>
+            </a:r>
+            <a:r>
+              <a:rPr lang="ru-RU" dirty="0" smtClean="0"/>
+              <a:t>Алгоритъм представлява крайна </a:t>
+            </a:r>
+            <a:r>
+              <a:rPr lang="ru-RU" dirty="0"/>
+              <a:t>поредица от инструкции или изрично описание на постъпкова процедура за решаване на даден </a:t>
+            </a:r>
+            <a:r>
+              <a:rPr lang="ru-RU" dirty="0" smtClean="0"/>
+              <a:t>проблем</a:t>
+            </a:r>
+          </a:p>
+          <a:p>
+            <a:r>
+              <a:rPr lang="ru-RU" dirty="0" smtClean="0"/>
+              <a:t>Алгоритмите са основна част от програмирането</a:t>
+            </a:r>
+          </a:p>
+          <a:p>
+            <a:r>
+              <a:rPr lang="ru-RU" dirty="0" smtClean="0"/>
+              <a:t>Добрите практики за синтез на алгоритми се основават на стратегията разделяи и владей</a:t>
+            </a:r>
+            <a:endParaRPr lang="en-US" dirty="0"/>
+          </a:p>
+        </p:txBody>
+      </p:sp>
+    </p:spTree>
+    <p:extLst>
+      <p:ext uri="{BB962C8B-B14F-4D97-AF65-F5344CB8AC3E}">
+        <p14:creationId xmlns:p14="http://schemas.microsoft.com/office/powerpoint/2010/main" val="3544602809"/>
+      </p:ext>
+    </p:extLst>
+  </p:cSld>
+  <p:clrMapOvr>
+    <a:masterClrMapping/>
+  </p:clrMapOvr>
+</p:sld>
+</file>
+
+<file path=ppt/slides/slide8.xml><?xml version="1.0" encoding="utf-8"?>
+<p:sld xmlns:a="http://schemas.openxmlformats.org/drawingml/2006/main" xmlns:r="http://schemas.openxmlformats.org/officeDocument/2006/relationships" xmlns:p="http://schemas.openxmlformats.org/presentationml/2006/main">
+  <p:cSld>
+    <p:spTree>
+      <p:nvGrpSpPr>
+        <p:cNvPr id="1" name=""/>
+        <p:cNvGrpSpPr/>
+        <p:nvPr/>
+      </p:nvGrpSpPr>
+      <p:grpSpPr>
+        <a:xfrm>
+          <a:off x="0" y="0"/>
+          <a:ext cx="0" cy="0"/>
+          <a:chOff x="0" y="0"/>
+          <a:chExt cx="0" cy="0"/>
+        </a:xfrm>
+      </p:grpSpPr>
+      <p:sp>
+        <p:nvSpPr>
+          <p:cNvPr id="2" name="Title 1"/>
+          <p:cNvSpPr>
+            <a:spLocks noGrp="1"/>
+          </p:cNvSpPr>
+          <p:nvPr>
+            <p:ph type="title"/>
+          </p:nvPr>
+        </p:nvSpPr>
+        <p:spPr/>
+        <p:txBody>
+          <a:bodyPr/>
+          <a:lstStyle/>
+          <a:p>
+            <a:pPr algn="ctr"/>
+            <a:r>
+              <a:rPr lang="bg-BG" dirty="0" smtClean="0"/>
+              <a:t>Видове алгоритми</a:t>
+            </a:r>
+            <a:endParaRPr lang="en-US" dirty="0"/>
+          </a:p>
+        </p:txBody>
+      </p:sp>
+      <p:sp>
+        <p:nvSpPr>
+          <p:cNvPr id="3" name="Content Placeholder 2"/>
+          <p:cNvSpPr>
+            <a:spLocks noGrp="1"/>
+          </p:cNvSpPr>
+          <p:nvPr>
+            <p:ph idx="1"/>
+          </p:nvPr>
+        </p:nvSpPr>
+        <p:spPr/>
+        <p:txBody>
+          <a:bodyPr>
+            <a:normAutofit fontScale="92500" lnSpcReduction="10000"/>
+          </a:bodyPr>
+          <a:lstStyle/>
+          <a:p>
+            <a:r>
+              <a:rPr lang="bg-BG" dirty="0" smtClean="0"/>
+              <a:t>Алгоритми за търсене</a:t>
+            </a:r>
+          </a:p>
+          <a:p>
+            <a:r>
+              <a:rPr lang="bg-BG" dirty="0" smtClean="0"/>
+              <a:t>Алгоритми за сортиране</a:t>
+            </a:r>
+          </a:p>
+          <a:p>
+            <a:r>
+              <a:rPr lang="bg-BG" dirty="0" smtClean="0"/>
+              <a:t>Алгоритми за графи и дървета</a:t>
+            </a:r>
+          </a:p>
+          <a:p>
+            <a:r>
+              <a:rPr lang="bg-BG" dirty="0" smtClean="0"/>
+              <a:t>Алгоритми за изчерпване</a:t>
+            </a:r>
+          </a:p>
+          <a:p>
+            <a:r>
+              <a:rPr lang="bg-BG" dirty="0" smtClean="0"/>
+              <a:t>Алгоритми с динамично </a:t>
+            </a:r>
+            <a:r>
+              <a:rPr lang="bg-BG" dirty="0" err="1" smtClean="0"/>
+              <a:t>оптимиране</a:t>
+            </a:r>
+            <a:endParaRPr lang="bg-BG" dirty="0" smtClean="0"/>
+          </a:p>
+          <a:p>
+            <a:r>
+              <a:rPr lang="bg-BG" dirty="0" smtClean="0"/>
+              <a:t>Алгоритми за криптиране/</a:t>
+            </a:r>
+            <a:r>
+              <a:rPr lang="bg-BG" dirty="0" err="1" smtClean="0"/>
+              <a:t>хеширане</a:t>
+            </a:r>
+            <a:endParaRPr lang="bg-BG" dirty="0" smtClean="0"/>
+          </a:p>
+          <a:p>
+            <a:r>
+              <a:rPr lang="bg-BG" dirty="0" smtClean="0"/>
+              <a:t>Алгоритми за </a:t>
+            </a:r>
+            <a:r>
+              <a:rPr lang="bg-BG" dirty="0" err="1" smtClean="0"/>
+              <a:t>рандомизация</a:t>
+            </a:r>
+            <a:endParaRPr lang="bg-BG" dirty="0" smtClean="0"/>
+          </a:p>
+        </p:txBody>
+      </p:sp>
+    </p:spTree>
+    <p:extLst>
+      <p:ext uri="{BB962C8B-B14F-4D97-AF65-F5344CB8AC3E}">
+        <p14:creationId xmlns:p14="http://schemas.microsoft.com/office/powerpoint/2010/main" val="250801546"/>
+      </p:ext>
+    </p:extLst>
+  </p:cSld>
+  <p:clrMapOvr>
+    <a:masterClrMapping/>
+  </p:clrMapOvr>
+</p:sld>
+</file>
+
+<file path=ppt/slides/slide9.xml><?xml version="1.0" encoding="utf-8"?>
+<p:sld xmlns:a="http://schemas.openxmlformats.org/drawingml/2006/main" xmlns:r="http://schemas.openxmlformats.org/officeDocument/2006/relationships" xmlns:p="http://schemas.openxmlformats.org/presentationml/2006/main">
+  <p:cSld>
+    <p:spTree>
+      <p:nvGrpSpPr>
+        <p:cNvPr id="1" name=""/>
+        <p:cNvGrpSpPr/>
+        <p:nvPr/>
+      </p:nvGrpSpPr>
+      <p:grpSpPr>
+        <a:xfrm>
+          <a:off x="0" y="0"/>
+          <a:ext cx="0" cy="0"/>
+          <a:chOff x="0" y="0"/>
+          <a:chExt cx="0" cy="0"/>
+        </a:xfrm>
+      </p:grpSpPr>
+      <p:sp>
+        <p:nvSpPr>
+          <p:cNvPr id="2" name="Title 1"/>
+          <p:cNvSpPr>
+            <a:spLocks noGrp="1"/>
+          </p:cNvSpPr>
+          <p:nvPr>
+            <p:ph type="title"/>
+          </p:nvPr>
+        </p:nvSpPr>
+        <p:spPr/>
+        <p:txBody>
+          <a:bodyPr/>
+          <a:lstStyle/>
+          <a:p>
+            <a:pPr algn="ctr"/>
+            <a:r>
+              <a:rPr lang="bg-BG" dirty="0" smtClean="0"/>
+              <a:t>Сложност на алгоритъм</a:t>
+            </a:r>
+            <a:endParaRPr lang="en-US" dirty="0"/>
+          </a:p>
+        </p:txBody>
+      </p:sp>
+      <p:sp>
+        <p:nvSpPr>
+          <p:cNvPr id="3" name="Content Placeholder 2"/>
+          <p:cNvSpPr>
+            <a:spLocks noGrp="1"/>
+          </p:cNvSpPr>
+          <p:nvPr>
+            <p:ph idx="1"/>
+          </p:nvPr>
+        </p:nvSpPr>
+        <p:spPr/>
+        <p:txBody>
+          <a:bodyPr/>
+          <a:lstStyle/>
+          <a:p>
+            <a:r>
+              <a:rPr lang="bg-BG" dirty="0" smtClean="0"/>
+              <a:t>Сложност на алгоритъм представлява броя на стъпките обуславящи дадено решение съотнесен към броя на входните данни </a:t>
+            </a:r>
+          </a:p>
+          <a:p>
+            <a:r>
+              <a:rPr lang="bg-BG" dirty="0" smtClean="0"/>
+              <a:t>Представлява метод за сравнение на бързодействието на различни алгоритми</a:t>
+            </a:r>
+          </a:p>
+          <a:p>
+            <a:r>
+              <a:rPr lang="bg-BG" dirty="0" smtClean="0"/>
+              <a:t>Сложността на алгоритъм се обозначава с т. нар. нотация </a:t>
+            </a:r>
+            <a:r>
+              <a:rPr lang="en-US" dirty="0" smtClean="0"/>
+              <a:t>Bit-O</a:t>
+            </a:r>
+            <a:endParaRPr lang="bg-BG" dirty="0" smtClean="0"/>
+          </a:p>
+        </p:txBody>
+      </p:sp>
+    </p:spTree>
+    <p:extLst>
+      <p:ext uri="{BB962C8B-B14F-4D97-AF65-F5344CB8AC3E}">
+        <p14:creationId xmlns:p14="http://schemas.microsoft.com/office/powerpoint/2010/main" val="1266323609"/>
       </p:ext>
     </p:extLst>
   </p:cSld>

</xml_diff>